<commit_message>
updated files for lecture
</commit_message>
<xml_diff>
--- a/Slides/On-Campus/06_02_FilesCSV.pptx
+++ b/Slides/On-Campus/06_02_FilesCSV.pptx
@@ -5,20 +5,22 @@
     <p:sldMasterId id="2147483648" r:id="rId1"/>
   </p:sldMasterIdLst>
   <p:notesMasterIdLst>
-    <p:notesMasterId r:id="rId10"/>
+    <p:notesMasterId r:id="rId12"/>
   </p:notesMasterIdLst>
   <p:handoutMasterIdLst>
-    <p:handoutMasterId r:id="rId11"/>
+    <p:handoutMasterId r:id="rId13"/>
   </p:handoutMasterIdLst>
   <p:sldIdLst>
     <p:sldId id="256" r:id="rId2"/>
-    <p:sldId id="263" r:id="rId3"/>
-    <p:sldId id="264" r:id="rId4"/>
-    <p:sldId id="265" r:id="rId5"/>
-    <p:sldId id="258" r:id="rId6"/>
-    <p:sldId id="259" r:id="rId7"/>
-    <p:sldId id="260" r:id="rId8"/>
-    <p:sldId id="261" r:id="rId9"/>
+    <p:sldId id="274" r:id="rId3"/>
+    <p:sldId id="263" r:id="rId4"/>
+    <p:sldId id="264" r:id="rId5"/>
+    <p:sldId id="265" r:id="rId6"/>
+    <p:sldId id="275" r:id="rId7"/>
+    <p:sldId id="258" r:id="rId8"/>
+    <p:sldId id="259" r:id="rId9"/>
+    <p:sldId id="260" r:id="rId10"/>
+    <p:sldId id="261" r:id="rId11"/>
   </p:sldIdLst>
   <p:sldSz cx="13817600" cy="7772400"/>
   <p:notesSz cx="6858000" cy="9144000"/>
@@ -221,7 +223,7 @@
           <a:p>
             <a:fld id="{4D7E51A5-B478-1E40-8CBB-0DAA8831E99D}" type="datetimeFigureOut">
               <a:rPr lang="en-US" smtClean="0"/>
-              <a:t>9/15/21</a:t>
+              <a:t>9/29/2021</a:t>
             </a:fld>
             <a:endParaRPr lang="en-US"/>
           </a:p>
@@ -386,7 +388,7 @@
           <a:p>
             <a:fld id="{D0ED587F-861E-6740-9643-E3DDAE89B8D6}" type="datetimeFigureOut">
               <a:rPr lang="en-US" smtClean="0"/>
-              <a:t>9/15/21</a:t>
+              <a:t>9/29/2021</a:t>
             </a:fld>
             <a:endParaRPr lang="en-US"/>
           </a:p>
@@ -7619,7 +7621,1006 @@
 </p:sld>
 </file>
 
+<file path=ppt/slides/slide10.xml><?xml version="1.0" encoding="utf-8"?>
+<p:sld xmlns:a="http://schemas.openxmlformats.org/drawingml/2006/main" xmlns:r="http://schemas.openxmlformats.org/officeDocument/2006/relationships" xmlns:p="http://schemas.openxmlformats.org/presentationml/2006/main" show="0">
+  <p:cSld>
+    <p:spTree>
+      <p:nvGrpSpPr>
+        <p:cNvPr id="1" name=""/>
+        <p:cNvGrpSpPr/>
+        <p:nvPr/>
+      </p:nvGrpSpPr>
+      <p:grpSpPr>
+        <a:xfrm>
+          <a:off x="0" y="0"/>
+          <a:ext cx="0" cy="0"/>
+          <a:chOff x="0" y="0"/>
+          <a:chExt cx="0" cy="0"/>
+        </a:xfrm>
+      </p:grpSpPr>
+      <p:sp>
+        <p:nvSpPr>
+          <p:cNvPr id="2" name="Title 1">
+            <a:extLst>
+              <a:ext uri="{FF2B5EF4-FFF2-40B4-BE49-F238E27FC236}">
+                <a16:creationId xmlns:a16="http://schemas.microsoft.com/office/drawing/2014/main" id="{CACDA05E-8C77-2441-AB67-601AE5ACD523}"/>
+              </a:ext>
+            </a:extLst>
+          </p:cNvPr>
+          <p:cNvSpPr>
+            <a:spLocks noGrp="1"/>
+          </p:cNvSpPr>
+          <p:nvPr>
+            <p:ph type="title"/>
+          </p:nvPr>
+        </p:nvSpPr>
+        <p:spPr/>
+        <p:txBody>
+          <a:bodyPr/>
+          <a:lstStyle/>
+          <a:p>
+            <a:r>
+              <a:rPr lang="en-US" dirty="0"/>
+              <a:t>Let’s Code</a:t>
+            </a:r>
+          </a:p>
+        </p:txBody>
+      </p:sp>
+      <p:sp>
+        <p:nvSpPr>
+          <p:cNvPr id="4" name="Rectangle 3">
+            <a:extLst>
+              <a:ext uri="{FF2B5EF4-FFF2-40B4-BE49-F238E27FC236}">
+                <a16:creationId xmlns:a16="http://schemas.microsoft.com/office/drawing/2014/main" id="{B2146367-1280-9A40-9942-114769B07EE5}"/>
+              </a:ext>
+            </a:extLst>
+          </p:cNvPr>
+          <p:cNvSpPr/>
+          <p:nvPr/>
+        </p:nvSpPr>
+        <p:spPr>
+          <a:xfrm>
+            <a:off x="3522134" y="1618910"/>
+            <a:ext cx="8410222" cy="3785652"/>
+          </a:xfrm>
+          <a:prstGeom prst="rect">
+            <a:avLst/>
+          </a:prstGeom>
+        </p:spPr>
+        <p:txBody>
+          <a:bodyPr wrap="square">
+            <a:spAutoFit/>
+          </a:bodyPr>
+          <a:lstStyle/>
+          <a:p>
+            <a:r>
+              <a:rPr lang="en-US" dirty="0">
+                <a:solidFill>
+                  <a:srgbClr val="CC7832"/>
+                </a:solidFill>
+                <a:latin typeface="Consolas" panose="020B0609020204030204" pitchFamily="49" charset="0"/>
+                <a:cs typeface="Consolas" panose="020B0609020204030204" pitchFamily="49" charset="0"/>
+              </a:rPr>
+              <a:t>def  </a:t>
+            </a:r>
+            <a:r>
+              <a:rPr lang="en-US" dirty="0" err="1">
+                <a:solidFill>
+                  <a:srgbClr val="FFC66D"/>
+                </a:solidFill>
+                <a:latin typeface="Consolas" panose="020B0609020204030204" pitchFamily="49" charset="0"/>
+                <a:cs typeface="Consolas" panose="020B0609020204030204" pitchFamily="49" charset="0"/>
+              </a:rPr>
+              <a:t>mob_reader</a:t>
+            </a:r>
+            <a:r>
+              <a:rPr lang="en-US" dirty="0">
+                <a:latin typeface="Consolas" panose="020B0609020204030204" pitchFamily="49" charset="0"/>
+                <a:cs typeface="Consolas" panose="020B0609020204030204" pitchFamily="49" charset="0"/>
+              </a:rPr>
+              <a:t>(filename</a:t>
+            </a:r>
+            <a:r>
+              <a:rPr lang="en-US" dirty="0">
+                <a:solidFill>
+                  <a:srgbClr val="CC7832"/>
+                </a:solidFill>
+                <a:latin typeface="Consolas" panose="020B0609020204030204" pitchFamily="49" charset="0"/>
+                <a:cs typeface="Consolas" panose="020B0609020204030204" pitchFamily="49" charset="0"/>
+              </a:rPr>
+              <a:t>, </a:t>
+            </a:r>
+            <a:r>
+              <a:rPr lang="en-US" dirty="0">
+                <a:latin typeface="Consolas" panose="020B0609020204030204" pitchFamily="49" charset="0"/>
+                <a:cs typeface="Consolas" panose="020B0609020204030204" pitchFamily="49" charset="0"/>
+              </a:rPr>
+              <a:t>name):</a:t>
+            </a:r>
+            <a:br>
+              <a:rPr lang="en-US" dirty="0">
+                <a:latin typeface="Consolas" panose="020B0609020204030204" pitchFamily="49" charset="0"/>
+                <a:cs typeface="Consolas" panose="020B0609020204030204" pitchFamily="49" charset="0"/>
+              </a:rPr>
+            </a:br>
+            <a:r>
+              <a:rPr lang="en-US" dirty="0">
+                <a:latin typeface="Consolas" panose="020B0609020204030204" pitchFamily="49" charset="0"/>
+                <a:cs typeface="Consolas" panose="020B0609020204030204" pitchFamily="49" charset="0"/>
+              </a:rPr>
+              <a:t>    </a:t>
+            </a:r>
+            <a:r>
+              <a:rPr lang="en-US" dirty="0" err="1">
+                <a:latin typeface="Consolas" panose="020B0609020204030204" pitchFamily="49" charset="0"/>
+                <a:cs typeface="Consolas" panose="020B0609020204030204" pitchFamily="49" charset="0"/>
+              </a:rPr>
+              <a:t>moblist</a:t>
+            </a:r>
+            <a:r>
+              <a:rPr lang="en-US" dirty="0">
+                <a:latin typeface="Consolas" panose="020B0609020204030204" pitchFamily="49" charset="0"/>
+                <a:cs typeface="Consolas" panose="020B0609020204030204" pitchFamily="49" charset="0"/>
+              </a:rPr>
+              <a:t> = []</a:t>
+            </a:r>
+            <a:br>
+              <a:rPr lang="en-US" dirty="0">
+                <a:latin typeface="Consolas" panose="020B0609020204030204" pitchFamily="49" charset="0"/>
+                <a:cs typeface="Consolas" panose="020B0609020204030204" pitchFamily="49" charset="0"/>
+              </a:rPr>
+            </a:br>
+            <a:r>
+              <a:rPr lang="en-US" dirty="0">
+                <a:latin typeface="Consolas" panose="020B0609020204030204" pitchFamily="49" charset="0"/>
+                <a:cs typeface="Consolas" panose="020B0609020204030204" pitchFamily="49" charset="0"/>
+              </a:rPr>
+              <a:t>    </a:t>
+            </a:r>
+            <a:r>
+              <a:rPr lang="en-US" dirty="0">
+                <a:solidFill>
+                  <a:srgbClr val="CC7832"/>
+                </a:solidFill>
+                <a:latin typeface="Consolas" panose="020B0609020204030204" pitchFamily="49" charset="0"/>
+                <a:cs typeface="Consolas" panose="020B0609020204030204" pitchFamily="49" charset="0"/>
+              </a:rPr>
+              <a:t>with </a:t>
+            </a:r>
+            <a:r>
+              <a:rPr lang="en-US" dirty="0">
+                <a:solidFill>
+                  <a:srgbClr val="8888C6"/>
+                </a:solidFill>
+                <a:latin typeface="Consolas" panose="020B0609020204030204" pitchFamily="49" charset="0"/>
+                <a:cs typeface="Consolas" panose="020B0609020204030204" pitchFamily="49" charset="0"/>
+              </a:rPr>
+              <a:t>open</a:t>
+            </a:r>
+            <a:r>
+              <a:rPr lang="en-US" dirty="0">
+                <a:latin typeface="Consolas" panose="020B0609020204030204" pitchFamily="49" charset="0"/>
+                <a:cs typeface="Consolas" panose="020B0609020204030204" pitchFamily="49" charset="0"/>
+              </a:rPr>
+              <a:t>(filename)  </a:t>
+            </a:r>
+            <a:r>
+              <a:rPr lang="en-US" dirty="0">
+                <a:solidFill>
+                  <a:srgbClr val="CC7832"/>
+                </a:solidFill>
+                <a:latin typeface="Consolas" panose="020B0609020204030204" pitchFamily="49" charset="0"/>
+                <a:cs typeface="Consolas" panose="020B0609020204030204" pitchFamily="49" charset="0"/>
+              </a:rPr>
+              <a:t>as  </a:t>
+            </a:r>
+            <a:r>
+              <a:rPr lang="en-US" dirty="0" err="1">
+                <a:latin typeface="Consolas" panose="020B0609020204030204" pitchFamily="49" charset="0"/>
+                <a:cs typeface="Consolas" panose="020B0609020204030204" pitchFamily="49" charset="0"/>
+              </a:rPr>
+              <a:t>csvfile</a:t>
+            </a:r>
+            <a:r>
+              <a:rPr lang="en-US" dirty="0">
+                <a:latin typeface="Consolas" panose="020B0609020204030204" pitchFamily="49" charset="0"/>
+                <a:cs typeface="Consolas" panose="020B0609020204030204" pitchFamily="49" charset="0"/>
+              </a:rPr>
+              <a:t>:</a:t>
+            </a:r>
+            <a:br>
+              <a:rPr lang="en-US" dirty="0">
+                <a:latin typeface="Consolas" panose="020B0609020204030204" pitchFamily="49" charset="0"/>
+                <a:cs typeface="Consolas" panose="020B0609020204030204" pitchFamily="49" charset="0"/>
+              </a:rPr>
+            </a:br>
+            <a:r>
+              <a:rPr lang="en-US" dirty="0">
+                <a:latin typeface="Consolas" panose="020B0609020204030204" pitchFamily="49" charset="0"/>
+                <a:cs typeface="Consolas" panose="020B0609020204030204" pitchFamily="49" charset="0"/>
+              </a:rPr>
+              <a:t>        mobs = </a:t>
+            </a:r>
+            <a:r>
+              <a:rPr lang="en-US" dirty="0" err="1">
+                <a:latin typeface="Consolas" panose="020B0609020204030204" pitchFamily="49" charset="0"/>
+                <a:cs typeface="Consolas" panose="020B0609020204030204" pitchFamily="49" charset="0"/>
+              </a:rPr>
+              <a:t>csv.reader</a:t>
+            </a:r>
+            <a:r>
+              <a:rPr lang="en-US" dirty="0">
+                <a:latin typeface="Consolas" panose="020B0609020204030204" pitchFamily="49" charset="0"/>
+                <a:cs typeface="Consolas" panose="020B0609020204030204" pitchFamily="49" charset="0"/>
+              </a:rPr>
+              <a:t>(</a:t>
+            </a:r>
+            <a:r>
+              <a:rPr lang="en-US" dirty="0" err="1">
+                <a:latin typeface="Consolas" panose="020B0609020204030204" pitchFamily="49" charset="0"/>
+                <a:cs typeface="Consolas" panose="020B0609020204030204" pitchFamily="49" charset="0"/>
+              </a:rPr>
+              <a:t>csvfile</a:t>
+            </a:r>
+            <a:r>
+              <a:rPr lang="en-US" dirty="0">
+                <a:latin typeface="Consolas" panose="020B0609020204030204" pitchFamily="49" charset="0"/>
+                <a:cs typeface="Consolas" panose="020B0609020204030204" pitchFamily="49" charset="0"/>
+              </a:rPr>
+              <a:t>)</a:t>
+            </a:r>
+            <a:br>
+              <a:rPr lang="en-US" dirty="0">
+                <a:latin typeface="Consolas" panose="020B0609020204030204" pitchFamily="49" charset="0"/>
+                <a:cs typeface="Consolas" panose="020B0609020204030204" pitchFamily="49" charset="0"/>
+              </a:rPr>
+            </a:br>
+            <a:r>
+              <a:rPr lang="en-US" dirty="0">
+                <a:latin typeface="Consolas" panose="020B0609020204030204" pitchFamily="49" charset="0"/>
+                <a:cs typeface="Consolas" panose="020B0609020204030204" pitchFamily="49" charset="0"/>
+              </a:rPr>
+              <a:t>        first = </a:t>
+            </a:r>
+            <a:r>
+              <a:rPr lang="en-US" dirty="0">
+                <a:solidFill>
+                  <a:srgbClr val="CC7832"/>
+                </a:solidFill>
+                <a:latin typeface="Consolas" panose="020B0609020204030204" pitchFamily="49" charset="0"/>
+                <a:cs typeface="Consolas" panose="020B0609020204030204" pitchFamily="49" charset="0"/>
+              </a:rPr>
+              <a:t>True</a:t>
+            </a:r>
+            <a:br>
+              <a:rPr lang="en-US" dirty="0">
+                <a:solidFill>
+                  <a:srgbClr val="CC7832"/>
+                </a:solidFill>
+                <a:latin typeface="Consolas" panose="020B0609020204030204" pitchFamily="49" charset="0"/>
+                <a:cs typeface="Consolas" panose="020B0609020204030204" pitchFamily="49" charset="0"/>
+              </a:rPr>
+            </a:br>
+            <a:r>
+              <a:rPr lang="en-US" dirty="0">
+                <a:solidFill>
+                  <a:srgbClr val="CC7832"/>
+                </a:solidFill>
+                <a:latin typeface="Consolas" panose="020B0609020204030204" pitchFamily="49" charset="0"/>
+                <a:cs typeface="Consolas" panose="020B0609020204030204" pitchFamily="49" charset="0"/>
+              </a:rPr>
+              <a:t>        for </a:t>
+            </a:r>
+            <a:r>
+              <a:rPr lang="en-US" dirty="0">
+                <a:latin typeface="Consolas" panose="020B0609020204030204" pitchFamily="49" charset="0"/>
+                <a:cs typeface="Consolas" panose="020B0609020204030204" pitchFamily="49" charset="0"/>
+              </a:rPr>
+              <a:t>mob </a:t>
+            </a:r>
+            <a:r>
+              <a:rPr lang="en-US" dirty="0">
+                <a:solidFill>
+                  <a:srgbClr val="CC7832"/>
+                </a:solidFill>
+                <a:latin typeface="Consolas" panose="020B0609020204030204" pitchFamily="49" charset="0"/>
+                <a:cs typeface="Consolas" panose="020B0609020204030204" pitchFamily="49" charset="0"/>
+              </a:rPr>
+              <a:t>in </a:t>
+            </a:r>
+            <a:r>
+              <a:rPr lang="en-US" dirty="0">
+                <a:latin typeface="Consolas" panose="020B0609020204030204" pitchFamily="49" charset="0"/>
+                <a:cs typeface="Consolas" panose="020B0609020204030204" pitchFamily="49" charset="0"/>
+              </a:rPr>
+              <a:t>mobs:</a:t>
+            </a:r>
+            <a:br>
+              <a:rPr lang="en-US" dirty="0">
+                <a:latin typeface="Consolas" panose="020B0609020204030204" pitchFamily="49" charset="0"/>
+                <a:cs typeface="Consolas" panose="020B0609020204030204" pitchFamily="49" charset="0"/>
+              </a:rPr>
+            </a:br>
+            <a:r>
+              <a:rPr lang="en-US" dirty="0">
+                <a:latin typeface="Consolas" panose="020B0609020204030204" pitchFamily="49" charset="0"/>
+                <a:cs typeface="Consolas" panose="020B0609020204030204" pitchFamily="49" charset="0"/>
+              </a:rPr>
+              <a:t>            </a:t>
+            </a:r>
+            <a:r>
+              <a:rPr lang="en-US" dirty="0">
+                <a:solidFill>
+                  <a:srgbClr val="CC7832"/>
+                </a:solidFill>
+                <a:latin typeface="Consolas" panose="020B0609020204030204" pitchFamily="49" charset="0"/>
+                <a:cs typeface="Consolas" panose="020B0609020204030204" pitchFamily="49" charset="0"/>
+              </a:rPr>
+              <a:t>if </a:t>
+            </a:r>
+            <a:r>
+              <a:rPr lang="en-US" dirty="0">
+                <a:latin typeface="Consolas" panose="020B0609020204030204" pitchFamily="49" charset="0"/>
+                <a:cs typeface="Consolas" panose="020B0609020204030204" pitchFamily="49" charset="0"/>
+              </a:rPr>
+              <a:t>first:</a:t>
+            </a:r>
+            <a:br>
+              <a:rPr lang="en-US" dirty="0">
+                <a:latin typeface="Consolas" panose="020B0609020204030204" pitchFamily="49" charset="0"/>
+                <a:cs typeface="Consolas" panose="020B0609020204030204" pitchFamily="49" charset="0"/>
+              </a:rPr>
+            </a:br>
+            <a:r>
+              <a:rPr lang="en-US" dirty="0">
+                <a:latin typeface="Consolas" panose="020B0609020204030204" pitchFamily="49" charset="0"/>
+                <a:cs typeface="Consolas" panose="020B0609020204030204" pitchFamily="49" charset="0"/>
+              </a:rPr>
+              <a:t>                first = </a:t>
+            </a:r>
+            <a:r>
+              <a:rPr lang="en-US" dirty="0">
+                <a:solidFill>
+                  <a:srgbClr val="CC7832"/>
+                </a:solidFill>
+                <a:latin typeface="Consolas" panose="020B0609020204030204" pitchFamily="49" charset="0"/>
+                <a:cs typeface="Consolas" panose="020B0609020204030204" pitchFamily="49" charset="0"/>
+              </a:rPr>
+              <a:t>False</a:t>
+            </a:r>
+            <a:br>
+              <a:rPr lang="en-US" dirty="0">
+                <a:solidFill>
+                  <a:srgbClr val="CC7832"/>
+                </a:solidFill>
+                <a:latin typeface="Consolas" panose="020B0609020204030204" pitchFamily="49" charset="0"/>
+                <a:cs typeface="Consolas" panose="020B0609020204030204" pitchFamily="49" charset="0"/>
+              </a:rPr>
+            </a:br>
+            <a:r>
+              <a:rPr lang="en-US" dirty="0">
+                <a:solidFill>
+                  <a:srgbClr val="CC7832"/>
+                </a:solidFill>
+                <a:latin typeface="Consolas" panose="020B0609020204030204" pitchFamily="49" charset="0"/>
+                <a:cs typeface="Consolas" panose="020B0609020204030204" pitchFamily="49" charset="0"/>
+              </a:rPr>
+              <a:t>                continue </a:t>
+            </a:r>
+            <a:r>
+              <a:rPr lang="en-US" dirty="0">
+                <a:solidFill>
+                  <a:srgbClr val="808080"/>
+                </a:solidFill>
+                <a:latin typeface="Consolas" panose="020B0609020204030204" pitchFamily="49" charset="0"/>
+                <a:cs typeface="Consolas" panose="020B0609020204030204" pitchFamily="49" charset="0"/>
+              </a:rPr>
+              <a:t>#  skip to start of loop</a:t>
+            </a:r>
+            <a:br>
+              <a:rPr lang="en-US" dirty="0">
+                <a:solidFill>
+                  <a:srgbClr val="808080"/>
+                </a:solidFill>
+                <a:latin typeface="Consolas" panose="020B0609020204030204" pitchFamily="49" charset="0"/>
+                <a:cs typeface="Consolas" panose="020B0609020204030204" pitchFamily="49" charset="0"/>
+              </a:rPr>
+            </a:br>
+            <a:r>
+              <a:rPr lang="en-US" dirty="0">
+                <a:solidFill>
+                  <a:srgbClr val="808080"/>
+                </a:solidFill>
+                <a:latin typeface="Consolas" panose="020B0609020204030204" pitchFamily="49" charset="0"/>
+                <a:cs typeface="Consolas" panose="020B0609020204030204" pitchFamily="49" charset="0"/>
+              </a:rPr>
+              <a:t>            </a:t>
+            </a:r>
+            <a:r>
+              <a:rPr lang="en-US" dirty="0">
+                <a:solidFill>
+                  <a:srgbClr val="CC7832"/>
+                </a:solidFill>
+                <a:latin typeface="Consolas" panose="020B0609020204030204" pitchFamily="49" charset="0"/>
+                <a:cs typeface="Consolas" panose="020B0609020204030204" pitchFamily="49" charset="0"/>
+              </a:rPr>
+              <a:t>if </a:t>
+            </a:r>
+            <a:r>
+              <a:rPr lang="en-US" dirty="0">
+                <a:latin typeface="Consolas" panose="020B0609020204030204" pitchFamily="49" charset="0"/>
+                <a:cs typeface="Consolas" panose="020B0609020204030204" pitchFamily="49" charset="0"/>
+              </a:rPr>
+              <a:t>mob[</a:t>
+            </a:r>
+            <a:r>
+              <a:rPr lang="en-US" dirty="0">
+                <a:solidFill>
+                  <a:srgbClr val="6897BB"/>
+                </a:solidFill>
+                <a:latin typeface="Consolas" panose="020B0609020204030204" pitchFamily="49" charset="0"/>
+                <a:cs typeface="Consolas" panose="020B0609020204030204" pitchFamily="49" charset="0"/>
+              </a:rPr>
+              <a:t>0</a:t>
+            </a:r>
+            <a:r>
+              <a:rPr lang="en-US" dirty="0">
+                <a:latin typeface="Consolas" panose="020B0609020204030204" pitchFamily="49" charset="0"/>
+                <a:cs typeface="Consolas" panose="020B0609020204030204" pitchFamily="49" charset="0"/>
+              </a:rPr>
+              <a:t>] == name:</a:t>
+            </a:r>
+            <a:br>
+              <a:rPr lang="en-US" dirty="0">
+                <a:latin typeface="Consolas" panose="020B0609020204030204" pitchFamily="49" charset="0"/>
+                <a:cs typeface="Consolas" panose="020B0609020204030204" pitchFamily="49" charset="0"/>
+              </a:rPr>
+            </a:br>
+            <a:r>
+              <a:rPr lang="en-US" dirty="0">
+                <a:latin typeface="Consolas" panose="020B0609020204030204" pitchFamily="49" charset="0"/>
+                <a:cs typeface="Consolas" panose="020B0609020204030204" pitchFamily="49" charset="0"/>
+              </a:rPr>
+              <a:t>                </a:t>
+            </a:r>
+            <a:r>
+              <a:rPr lang="en-US" dirty="0" err="1">
+                <a:latin typeface="Consolas" panose="020B0609020204030204" pitchFamily="49" charset="0"/>
+                <a:cs typeface="Consolas" panose="020B0609020204030204" pitchFamily="49" charset="0"/>
+              </a:rPr>
+              <a:t>moblist.append</a:t>
+            </a:r>
+            <a:r>
+              <a:rPr lang="en-US" dirty="0">
+                <a:latin typeface="Consolas" panose="020B0609020204030204" pitchFamily="49" charset="0"/>
+                <a:cs typeface="Consolas" panose="020B0609020204030204" pitchFamily="49" charset="0"/>
+              </a:rPr>
+              <a:t>(mob)</a:t>
+            </a:r>
+            <a:br>
+              <a:rPr lang="en-US" dirty="0">
+                <a:latin typeface="Consolas" panose="020B0609020204030204" pitchFamily="49" charset="0"/>
+                <a:cs typeface="Consolas" panose="020B0609020204030204" pitchFamily="49" charset="0"/>
+              </a:rPr>
+            </a:br>
+            <a:r>
+              <a:rPr lang="en-US" dirty="0">
+                <a:latin typeface="Consolas" panose="020B0609020204030204" pitchFamily="49" charset="0"/>
+                <a:cs typeface="Consolas" panose="020B0609020204030204" pitchFamily="49" charset="0"/>
+              </a:rPr>
+              <a:t>    </a:t>
+            </a:r>
+            <a:r>
+              <a:rPr lang="en-US" dirty="0">
+                <a:solidFill>
+                  <a:srgbClr val="CC7832"/>
+                </a:solidFill>
+                <a:latin typeface="Consolas" panose="020B0609020204030204" pitchFamily="49" charset="0"/>
+                <a:cs typeface="Consolas" panose="020B0609020204030204" pitchFamily="49" charset="0"/>
+              </a:rPr>
+              <a:t>return </a:t>
+            </a:r>
+            <a:r>
+              <a:rPr lang="en-US" dirty="0" err="1">
+                <a:latin typeface="Consolas" panose="020B0609020204030204" pitchFamily="49" charset="0"/>
+                <a:cs typeface="Consolas" panose="020B0609020204030204" pitchFamily="49" charset="0"/>
+              </a:rPr>
+              <a:t>moblist</a:t>
+            </a:r>
+            <a:endParaRPr lang="en-US" dirty="0">
+              <a:latin typeface="Consolas" panose="020B0609020204030204" pitchFamily="49" charset="0"/>
+              <a:cs typeface="Consolas" panose="020B0609020204030204" pitchFamily="49" charset="0"/>
+            </a:endParaRPr>
+          </a:p>
+        </p:txBody>
+      </p:sp>
+      <p:sp>
+        <p:nvSpPr>
+          <p:cNvPr id="5" name="Rectangle 4">
+            <a:extLst>
+              <a:ext uri="{FF2B5EF4-FFF2-40B4-BE49-F238E27FC236}">
+                <a16:creationId xmlns:a16="http://schemas.microsoft.com/office/drawing/2014/main" id="{6AAD0EB7-0786-5D44-A825-BDCF6A014C33}"/>
+              </a:ext>
+            </a:extLst>
+          </p:cNvPr>
+          <p:cNvSpPr/>
+          <p:nvPr/>
+        </p:nvSpPr>
+        <p:spPr>
+          <a:xfrm>
+            <a:off x="3522134" y="5491770"/>
+            <a:ext cx="6908800" cy="1323439"/>
+          </a:xfrm>
+          <a:prstGeom prst="rect">
+            <a:avLst/>
+          </a:prstGeom>
+        </p:spPr>
+        <p:txBody>
+          <a:bodyPr>
+            <a:spAutoFit/>
+          </a:bodyPr>
+          <a:lstStyle/>
+          <a:p>
+            <a:r>
+              <a:rPr lang="en-US" dirty="0">
+                <a:solidFill>
+                  <a:srgbClr val="CC7832"/>
+                </a:solidFill>
+                <a:latin typeface="Consolas" panose="020B0609020204030204" pitchFamily="49" charset="0"/>
+                <a:cs typeface="Consolas" panose="020B0609020204030204" pitchFamily="49" charset="0"/>
+              </a:rPr>
+              <a:t>def </a:t>
+            </a:r>
+            <a:r>
+              <a:rPr lang="en-US" dirty="0" err="1">
+                <a:solidFill>
+                  <a:srgbClr val="FFC66D"/>
+                </a:solidFill>
+                <a:latin typeface="Consolas" panose="020B0609020204030204" pitchFamily="49" charset="0"/>
+                <a:cs typeface="Consolas" panose="020B0609020204030204" pitchFamily="49" charset="0"/>
+              </a:rPr>
+              <a:t>readpoem</a:t>
+            </a:r>
+            <a:r>
+              <a:rPr lang="en-US" dirty="0">
+                <a:latin typeface="Consolas" panose="020B0609020204030204" pitchFamily="49" charset="0"/>
+                <a:cs typeface="Consolas" panose="020B0609020204030204" pitchFamily="49" charset="0"/>
+              </a:rPr>
+              <a:t>(filename):</a:t>
+            </a:r>
+            <a:br>
+              <a:rPr lang="en-US" dirty="0">
+                <a:latin typeface="Consolas" panose="020B0609020204030204" pitchFamily="49" charset="0"/>
+                <a:cs typeface="Consolas" panose="020B0609020204030204" pitchFamily="49" charset="0"/>
+              </a:rPr>
+            </a:br>
+            <a:r>
+              <a:rPr lang="en-US" dirty="0">
+                <a:latin typeface="Consolas" panose="020B0609020204030204" pitchFamily="49" charset="0"/>
+                <a:cs typeface="Consolas" panose="020B0609020204030204" pitchFamily="49" charset="0"/>
+              </a:rPr>
+              <a:t>    </a:t>
+            </a:r>
+            <a:r>
+              <a:rPr lang="en-US" dirty="0">
+                <a:solidFill>
+                  <a:srgbClr val="CC7832"/>
+                </a:solidFill>
+                <a:latin typeface="Consolas" panose="020B0609020204030204" pitchFamily="49" charset="0"/>
+                <a:cs typeface="Consolas" panose="020B0609020204030204" pitchFamily="49" charset="0"/>
+              </a:rPr>
+              <a:t>with </a:t>
+            </a:r>
+            <a:r>
+              <a:rPr lang="en-US" dirty="0">
+                <a:solidFill>
+                  <a:srgbClr val="8888C6"/>
+                </a:solidFill>
+                <a:latin typeface="Consolas" panose="020B0609020204030204" pitchFamily="49" charset="0"/>
+                <a:cs typeface="Consolas" panose="020B0609020204030204" pitchFamily="49" charset="0"/>
+              </a:rPr>
+              <a:t>open</a:t>
+            </a:r>
+            <a:r>
+              <a:rPr lang="en-US" dirty="0">
+                <a:latin typeface="Consolas" panose="020B0609020204030204" pitchFamily="49" charset="0"/>
+                <a:cs typeface="Consolas" panose="020B0609020204030204" pitchFamily="49" charset="0"/>
+              </a:rPr>
+              <a:t>(filename)  </a:t>
+            </a:r>
+            <a:r>
+              <a:rPr lang="en-US" dirty="0">
+                <a:solidFill>
+                  <a:srgbClr val="CC7832"/>
+                </a:solidFill>
+                <a:latin typeface="Consolas" panose="020B0609020204030204" pitchFamily="49" charset="0"/>
+                <a:cs typeface="Consolas" panose="020B0609020204030204" pitchFamily="49" charset="0"/>
+              </a:rPr>
+              <a:t>as </a:t>
+            </a:r>
+            <a:r>
+              <a:rPr lang="en-US" dirty="0">
+                <a:latin typeface="Consolas" panose="020B0609020204030204" pitchFamily="49" charset="0"/>
+                <a:cs typeface="Consolas" panose="020B0609020204030204" pitchFamily="49" charset="0"/>
+              </a:rPr>
+              <a:t>f:</a:t>
+            </a:r>
+            <a:br>
+              <a:rPr lang="en-US" dirty="0">
+                <a:latin typeface="Consolas" panose="020B0609020204030204" pitchFamily="49" charset="0"/>
+                <a:cs typeface="Consolas" panose="020B0609020204030204" pitchFamily="49" charset="0"/>
+              </a:rPr>
+            </a:br>
+            <a:r>
+              <a:rPr lang="en-US" dirty="0">
+                <a:latin typeface="Consolas" panose="020B0609020204030204" pitchFamily="49" charset="0"/>
+                <a:cs typeface="Consolas" panose="020B0609020204030204" pitchFamily="49" charset="0"/>
+              </a:rPr>
+              <a:t>        poem = </a:t>
+            </a:r>
+            <a:r>
+              <a:rPr lang="en-US" dirty="0" err="1">
+                <a:latin typeface="Consolas" panose="020B0609020204030204" pitchFamily="49" charset="0"/>
+                <a:cs typeface="Consolas" panose="020B0609020204030204" pitchFamily="49" charset="0"/>
+              </a:rPr>
+              <a:t>f.read</a:t>
+            </a:r>
+            <a:r>
+              <a:rPr lang="en-US" dirty="0">
+                <a:latin typeface="Consolas" panose="020B0609020204030204" pitchFamily="49" charset="0"/>
+                <a:cs typeface="Consolas" panose="020B0609020204030204" pitchFamily="49" charset="0"/>
+              </a:rPr>
+              <a:t>()</a:t>
+            </a:r>
+            <a:br>
+              <a:rPr lang="en-US" dirty="0">
+                <a:latin typeface="Consolas" panose="020B0609020204030204" pitchFamily="49" charset="0"/>
+                <a:cs typeface="Consolas" panose="020B0609020204030204" pitchFamily="49" charset="0"/>
+              </a:rPr>
+            </a:br>
+            <a:r>
+              <a:rPr lang="en-US" dirty="0">
+                <a:latin typeface="Consolas" panose="020B0609020204030204" pitchFamily="49" charset="0"/>
+                <a:cs typeface="Consolas" panose="020B0609020204030204" pitchFamily="49" charset="0"/>
+              </a:rPr>
+              <a:t>        </a:t>
+            </a:r>
+            <a:r>
+              <a:rPr lang="en-US" dirty="0">
+                <a:solidFill>
+                  <a:srgbClr val="CC7832"/>
+                </a:solidFill>
+                <a:latin typeface="Consolas" panose="020B0609020204030204" pitchFamily="49" charset="0"/>
+                <a:cs typeface="Consolas" panose="020B0609020204030204" pitchFamily="49" charset="0"/>
+              </a:rPr>
+              <a:t>return </a:t>
+            </a:r>
+            <a:r>
+              <a:rPr lang="en-US" dirty="0">
+                <a:latin typeface="Consolas" panose="020B0609020204030204" pitchFamily="49" charset="0"/>
+                <a:cs typeface="Consolas" panose="020B0609020204030204" pitchFamily="49" charset="0"/>
+              </a:rPr>
+              <a:t>poem</a:t>
+            </a:r>
+          </a:p>
+        </p:txBody>
+      </p:sp>
+    </p:spTree>
+    <p:extLst>
+      <p:ext uri="{BB962C8B-B14F-4D97-AF65-F5344CB8AC3E}">
+        <p14:creationId xmlns:p14="http://schemas.microsoft.com/office/powerpoint/2010/main" val="3525479270"/>
+      </p:ext>
+    </p:extLst>
+  </p:cSld>
+  <p:clrMapOvr>
+    <a:masterClrMapping/>
+  </p:clrMapOvr>
+  <mc:AlternateContent xmlns:mc="http://schemas.openxmlformats.org/markup-compatibility/2006">
+    <mc:Choice xmlns:p14="http://schemas.microsoft.com/office/powerpoint/2010/main" Requires="p14">
+      <p:transition p14:dur="300">
+        <p:fade/>
+      </p:transition>
+    </mc:Choice>
+    <mc:Fallback>
+      <p:transition>
+        <p:fade/>
+      </p:transition>
+    </mc:Fallback>
+  </mc:AlternateContent>
+</p:sld>
+</file>
+
 <file path=ppt/slides/slide2.xml><?xml version="1.0" encoding="utf-8"?>
+<p:sld xmlns:a="http://schemas.openxmlformats.org/drawingml/2006/main" xmlns:r="http://schemas.openxmlformats.org/officeDocument/2006/relationships" xmlns:p="http://schemas.openxmlformats.org/presentationml/2006/main">
+  <p:cSld>
+    <p:spTree>
+      <p:nvGrpSpPr>
+        <p:cNvPr id="1" name=""/>
+        <p:cNvGrpSpPr/>
+        <p:nvPr/>
+      </p:nvGrpSpPr>
+      <p:grpSpPr>
+        <a:xfrm>
+          <a:off x="0" y="0"/>
+          <a:ext cx="0" cy="0"/>
+          <a:chOff x="0" y="0"/>
+          <a:chExt cx="0" cy="0"/>
+        </a:xfrm>
+      </p:grpSpPr>
+      <p:sp>
+        <p:nvSpPr>
+          <p:cNvPr id="4" name="Title 3">
+            <a:extLst>
+              <a:ext uri="{FF2B5EF4-FFF2-40B4-BE49-F238E27FC236}">
+                <a16:creationId xmlns:a16="http://schemas.microsoft.com/office/drawing/2014/main" id="{119AD8F2-D5DB-A84B-A5B3-F7935E3E6D1D}"/>
+              </a:ext>
+            </a:extLst>
+          </p:cNvPr>
+          <p:cNvSpPr>
+            <a:spLocks noGrp="1"/>
+          </p:cNvSpPr>
+          <p:nvPr>
+            <p:ph type="title"/>
+          </p:nvPr>
+        </p:nvSpPr>
+        <p:spPr>
+          <a:xfrm>
+            <a:off x="628076" y="607804"/>
+            <a:ext cx="5642096" cy="916848"/>
+          </a:xfrm>
+        </p:spPr>
+        <p:txBody>
+          <a:bodyPr/>
+          <a:lstStyle/>
+          <a:p>
+            <a:r>
+              <a:rPr lang="en-US" dirty="0"/>
+              <a:t>Announcements</a:t>
+            </a:r>
+          </a:p>
+        </p:txBody>
+      </p:sp>
+      <p:sp>
+        <p:nvSpPr>
+          <p:cNvPr id="5" name="Text Placeholder 4">
+            <a:extLst>
+              <a:ext uri="{FF2B5EF4-FFF2-40B4-BE49-F238E27FC236}">
+                <a16:creationId xmlns:a16="http://schemas.microsoft.com/office/drawing/2014/main" id="{1BBD0DB5-379A-304F-9307-E7B1A89B08F7}"/>
+              </a:ext>
+            </a:extLst>
+          </p:cNvPr>
+          <p:cNvSpPr>
+            <a:spLocks noGrp="1"/>
+          </p:cNvSpPr>
+          <p:nvPr>
+            <p:ph type="body" idx="1"/>
+          </p:nvPr>
+        </p:nvSpPr>
+        <p:spPr>
+          <a:xfrm>
+            <a:off x="628075" y="1647163"/>
+            <a:ext cx="8395419" cy="4379259"/>
+          </a:xfrm>
+        </p:spPr>
+        <p:txBody>
+          <a:bodyPr/>
+          <a:lstStyle/>
+          <a:p>
+            <a:pPr marL="930762" lvl="1" indent="0">
+              <a:buNone/>
+            </a:pPr>
+            <a:endParaRPr lang="en-US" dirty="0"/>
+          </a:p>
+          <a:p>
+            <a:r>
+              <a:rPr lang="en-US" dirty="0"/>
+              <a:t>Reminder – readings are due </a:t>
+            </a:r>
+            <a:r>
+              <a:rPr lang="en-US" b="1" dirty="0"/>
+              <a:t>before</a:t>
+            </a:r>
+            <a:r>
+              <a:rPr lang="en-US" dirty="0"/>
+              <a:t> lecture</a:t>
+            </a:r>
+          </a:p>
+          <a:p>
+            <a:pPr lvl="1"/>
+            <a:r>
+              <a:rPr lang="en-US" dirty="0"/>
+              <a:t>You don’t have to do all of it - challenge problems can be challenging…</a:t>
+            </a:r>
+          </a:p>
+          <a:p>
+            <a:pPr lvl="1"/>
+            <a:r>
+              <a:rPr lang="en-US" dirty="0"/>
+              <a:t>You can return to them. </a:t>
+            </a:r>
+          </a:p>
+          <a:p>
+            <a:pPr lvl="1"/>
+            <a:r>
+              <a:rPr lang="en-US" dirty="0"/>
+              <a:t>We start off each lecture with a quiz from your reading! </a:t>
+            </a:r>
+          </a:p>
+          <a:p>
+            <a:r>
+              <a:rPr lang="en-US" dirty="0"/>
+              <a:t>Make sure to review knowledge checks and spread out their use! </a:t>
+            </a:r>
+          </a:p>
+          <a:p>
+            <a:endParaRPr lang="en-US" dirty="0"/>
+          </a:p>
+          <a:p>
+            <a:r>
+              <a:rPr lang="en-US" dirty="0"/>
+              <a:t>Grace Hopper Celebration – Check Canvas Announcement</a:t>
+            </a:r>
+          </a:p>
+        </p:txBody>
+      </p:sp>
+      <p:sp>
+        <p:nvSpPr>
+          <p:cNvPr id="6" name="TextBox 5">
+            <a:extLst>
+              <a:ext uri="{FF2B5EF4-FFF2-40B4-BE49-F238E27FC236}">
+                <a16:creationId xmlns:a16="http://schemas.microsoft.com/office/drawing/2014/main" id="{32A3B87A-BBC0-704B-AC99-3984206450D5}"/>
+              </a:ext>
+            </a:extLst>
+          </p:cNvPr>
+          <p:cNvSpPr txBox="1"/>
+          <p:nvPr/>
+        </p:nvSpPr>
+        <p:spPr>
+          <a:xfrm>
+            <a:off x="9744412" y="2150737"/>
+            <a:ext cx="3892958" cy="2882712"/>
+          </a:xfrm>
+          <a:prstGeom prst="rect">
+            <a:avLst/>
+          </a:prstGeom>
+          <a:noFill/>
+        </p:spPr>
+        <p:txBody>
+          <a:bodyPr wrap="square" rtlCol="0">
+            <a:spAutoFit/>
+          </a:bodyPr>
+          <a:lstStyle/>
+          <a:p>
+            <a:r>
+              <a:rPr lang="en-US" sz="3022" dirty="0" err="1"/>
+              <a:t>Todo</a:t>
+            </a:r>
+            <a:r>
+              <a:rPr lang="en-US" sz="3022" dirty="0"/>
+              <a:t>:</a:t>
+            </a:r>
+          </a:p>
+          <a:p>
+            <a:r>
+              <a:rPr lang="en-US" sz="3022" dirty="0"/>
+              <a:t>Start on Inclusive Design Paper (due next week)</a:t>
+            </a:r>
+          </a:p>
+          <a:p>
+            <a:endParaRPr lang="en-US" sz="3022" dirty="0"/>
+          </a:p>
+          <a:p>
+            <a:endParaRPr lang="en-US" sz="3022" dirty="0"/>
+          </a:p>
+        </p:txBody>
+      </p:sp>
+      <p:sp>
+        <p:nvSpPr>
+          <p:cNvPr id="3" name="TextBox 2">
+            <a:extLst>
+              <a:ext uri="{FF2B5EF4-FFF2-40B4-BE49-F238E27FC236}">
+                <a16:creationId xmlns:a16="http://schemas.microsoft.com/office/drawing/2014/main" id="{219403AF-FCA0-4FAD-B2CD-E3D24CF8DD27}"/>
+              </a:ext>
+            </a:extLst>
+          </p:cNvPr>
+          <p:cNvSpPr txBox="1"/>
+          <p:nvPr/>
+        </p:nvSpPr>
+        <p:spPr>
+          <a:xfrm>
+            <a:off x="628075" y="6148934"/>
+            <a:ext cx="10580915" cy="1015663"/>
+          </a:xfrm>
+          <a:prstGeom prst="rect">
+            <a:avLst/>
+          </a:prstGeom>
+          <a:noFill/>
+        </p:spPr>
+        <p:txBody>
+          <a:bodyPr wrap="square" rtlCol="0">
+            <a:spAutoFit/>
+          </a:bodyPr>
+          <a:lstStyle/>
+          <a:p>
+            <a:r>
+              <a:rPr lang="en-US" dirty="0"/>
+              <a:t>CS 164 – Next Course In Sequence, also consider CS 220 (math and stats especially) </a:t>
+            </a:r>
+          </a:p>
+          <a:p>
+            <a:r>
+              <a:rPr lang="en-US" dirty="0"/>
+              <a:t>CO Jobs Report 2021 – 77% of *all* new jobs in Colorado require programming</a:t>
+            </a:r>
+          </a:p>
+          <a:p>
+            <a:r>
+              <a:rPr lang="en-US" dirty="0"/>
+              <a:t>60% of all STEM jobs requires *advanced* (200-300 level) </a:t>
+            </a:r>
+          </a:p>
+        </p:txBody>
+      </p:sp>
+      <p:sp>
+        <p:nvSpPr>
+          <p:cNvPr id="7" name="TextBox 6">
+            <a:extLst>
+              <a:ext uri="{FF2B5EF4-FFF2-40B4-BE49-F238E27FC236}">
+                <a16:creationId xmlns:a16="http://schemas.microsoft.com/office/drawing/2014/main" id="{BF16D510-BC74-4FA5-AFD2-193B039115A5}"/>
+              </a:ext>
+            </a:extLst>
+          </p:cNvPr>
+          <p:cNvSpPr txBox="1"/>
+          <p:nvPr/>
+        </p:nvSpPr>
+        <p:spPr>
+          <a:xfrm>
+            <a:off x="7228114" y="362857"/>
+            <a:ext cx="6125029" cy="1015663"/>
+          </a:xfrm>
+          <a:prstGeom prst="rect">
+            <a:avLst/>
+          </a:prstGeom>
+          <a:solidFill>
+            <a:schemeClr val="accent2"/>
+          </a:solidFill>
+        </p:spPr>
+        <p:txBody>
+          <a:bodyPr wrap="square" rtlCol="0">
+            <a:spAutoFit/>
+          </a:bodyPr>
+          <a:lstStyle/>
+          <a:p>
+            <a:r>
+              <a:rPr lang="en-US" b="1" dirty="0"/>
+              <a:t>Opening Question: </a:t>
+            </a:r>
+          </a:p>
+          <a:p>
+            <a:r>
+              <a:rPr lang="en-US" dirty="0"/>
+              <a:t>What computer type do you use the most? Windows, Mac, Android tablet?</a:t>
+            </a:r>
+          </a:p>
+        </p:txBody>
+      </p:sp>
+    </p:spTree>
+    <p:extLst>
+      <p:ext uri="{BB962C8B-B14F-4D97-AF65-F5344CB8AC3E}">
+        <p14:creationId xmlns:p14="http://schemas.microsoft.com/office/powerpoint/2010/main" val="926474781"/>
+      </p:ext>
+    </p:extLst>
+  </p:cSld>
+  <p:clrMapOvr>
+    <a:masterClrMapping/>
+  </p:clrMapOvr>
+  <p:transition>
+    <p:fade/>
+  </p:transition>
+</p:sld>
+</file>
+
+<file path=ppt/slides/slide3.xml><?xml version="1.0" encoding="utf-8"?>
 <p:sld xmlns:a="http://schemas.openxmlformats.org/drawingml/2006/main" xmlns:r="http://schemas.openxmlformats.org/officeDocument/2006/relationships" xmlns:p="http://schemas.openxmlformats.org/presentationml/2006/main">
   <p:cSld>
     <p:spTree>
@@ -7698,10 +8699,10 @@
               <a:buChar char="●"/>
             </a:pPr>
             <a:r>
-              <a:rPr lang="en"/>
+              <a:rPr lang="en" dirty="0"/>
               <a:t>You use them daily </a:t>
             </a:r>
-            <a:endParaRPr/>
+            <a:endParaRPr dirty="0"/>
           </a:p>
           <a:p>
             <a:pPr lvl="1">
@@ -7711,10 +8712,10 @@
               <a:buChar char="○"/>
             </a:pPr>
             <a:r>
-              <a:rPr lang="en"/>
+              <a:rPr lang="en" dirty="0"/>
               <a:t>Most common OS in the world? </a:t>
             </a:r>
-            <a:endParaRPr/>
+            <a:endParaRPr dirty="0"/>
           </a:p>
           <a:p>
             <a:pPr lvl="1">
@@ -7724,10 +8725,10 @@
               <a:buChar char="○"/>
             </a:pPr>
             <a:r>
-              <a:rPr lang="en"/>
+              <a:rPr lang="en" dirty="0"/>
               <a:t>Android </a:t>
             </a:r>
-            <a:endParaRPr/>
+            <a:endParaRPr dirty="0"/>
           </a:p>
           <a:p>
             <a:pPr lvl="2">
@@ -7737,10 +8738,10 @@
               <a:buChar char="■"/>
             </a:pPr>
             <a:r>
-              <a:rPr lang="en"/>
+              <a:rPr lang="en" dirty="0"/>
               <a:t>Written in Java w/ Kotlin </a:t>
             </a:r>
-            <a:endParaRPr/>
+            <a:endParaRPr dirty="0"/>
           </a:p>
           <a:p>
             <a:pPr>
@@ -7750,10 +8751,10 @@
               <a:buChar char="●"/>
             </a:pPr>
             <a:r>
-              <a:rPr lang="en"/>
-              <a:t>The control</a:t>
-            </a:r>
-            <a:endParaRPr/>
+              <a:rPr lang="en" dirty="0"/>
+              <a:t>They control</a:t>
+            </a:r>
+            <a:endParaRPr dirty="0"/>
           </a:p>
           <a:p>
             <a:pPr lvl="1">
@@ -7763,10 +8764,10 @@
               <a:buChar char="○"/>
             </a:pPr>
             <a:r>
-              <a:rPr lang="en"/>
+              <a:rPr lang="en" dirty="0"/>
               <a:t>Resources</a:t>
             </a:r>
-            <a:endParaRPr/>
+            <a:endParaRPr dirty="0"/>
           </a:p>
           <a:p>
             <a:pPr lvl="1">
@@ -7776,10 +8777,10 @@
               <a:buChar char="○"/>
             </a:pPr>
             <a:r>
-              <a:rPr lang="en"/>
+              <a:rPr lang="en" dirty="0"/>
               <a:t>Hardware Interaction</a:t>
             </a:r>
-            <a:endParaRPr/>
+            <a:endParaRPr dirty="0"/>
           </a:p>
           <a:p>
             <a:pPr lvl="1">
@@ -7789,10 +8790,10 @@
               <a:buChar char="○"/>
             </a:pPr>
             <a:r>
-              <a:rPr lang="en"/>
+              <a:rPr lang="en" dirty="0"/>
               <a:t>Devices </a:t>
             </a:r>
-            <a:endParaRPr/>
+            <a:endParaRPr dirty="0"/>
           </a:p>
           <a:p>
             <a:pPr lvl="1">
@@ -7802,10 +8803,10 @@
               <a:buChar char="○"/>
             </a:pPr>
             <a:r>
-              <a:rPr lang="en"/>
+              <a:rPr lang="en" dirty="0"/>
               <a:t>Running applications, memory, etc</a:t>
             </a:r>
-            <a:endParaRPr/>
+            <a:endParaRPr dirty="0"/>
           </a:p>
           <a:p>
             <a:pPr lvl="1">
@@ -7815,10 +8816,10 @@
               <a:buChar char="○"/>
             </a:pPr>
             <a:r>
-              <a:rPr lang="en"/>
+              <a:rPr lang="en" dirty="0"/>
               <a:t>Files! </a:t>
             </a:r>
-            <a:endParaRPr/>
+            <a:endParaRPr dirty="0"/>
           </a:p>
         </p:txBody>
       </p:sp>
@@ -8053,7 +9054,7 @@
 </p:sld>
 </file>
 
-<file path=ppt/slides/slide3.xml><?xml version="1.0" encoding="utf-8"?>
+<file path=ppt/slides/slide4.xml><?xml version="1.0" encoding="utf-8"?>
 <p:sld xmlns:a="http://schemas.openxmlformats.org/drawingml/2006/main" xmlns:r="http://schemas.openxmlformats.org/officeDocument/2006/relationships" xmlns:p="http://schemas.openxmlformats.org/presentationml/2006/main">
   <p:cSld>
     <p:spTree>
@@ -8992,7 +9993,7 @@
 </p:sld>
 </file>
 
-<file path=ppt/slides/slide4.xml><?xml version="1.0" encoding="utf-8"?>
+<file path=ppt/slides/slide5.xml><?xml version="1.0" encoding="utf-8"?>
 <p:sld xmlns:a="http://schemas.openxmlformats.org/drawingml/2006/main" xmlns:r="http://schemas.openxmlformats.org/officeDocument/2006/relationships" xmlns:p="http://schemas.openxmlformats.org/presentationml/2006/main">
   <p:cSld>
     <p:spTree>
@@ -9306,7 +10307,1208 @@
 </p:sld>
 </file>
 
-<file path=ppt/slides/slide5.xml><?xml version="1.0" encoding="utf-8"?>
+<file path=ppt/slides/slide6.xml><?xml version="1.0" encoding="utf-8"?>
+<p:sld xmlns:a="http://schemas.openxmlformats.org/drawingml/2006/main" xmlns:r="http://schemas.openxmlformats.org/officeDocument/2006/relationships" xmlns:p="http://schemas.openxmlformats.org/presentationml/2006/main">
+  <p:cSld>
+    <p:spTree>
+      <p:nvGrpSpPr>
+        <p:cNvPr id="1" name=""/>
+        <p:cNvGrpSpPr/>
+        <p:nvPr/>
+      </p:nvGrpSpPr>
+      <p:grpSpPr>
+        <a:xfrm>
+          <a:off x="0" y="0"/>
+          <a:ext cx="0" cy="0"/>
+          <a:chOff x="0" y="0"/>
+          <a:chExt cx="0" cy="0"/>
+        </a:xfrm>
+      </p:grpSpPr>
+      <p:sp>
+        <p:nvSpPr>
+          <p:cNvPr id="2" name="Title 1">
+            <a:extLst>
+              <a:ext uri="{FF2B5EF4-FFF2-40B4-BE49-F238E27FC236}">
+                <a16:creationId xmlns:a16="http://schemas.microsoft.com/office/drawing/2014/main" id="{F942AB67-B7F1-4A2D-8B8C-CC590D765C3B}"/>
+              </a:ext>
+            </a:extLst>
+          </p:cNvPr>
+          <p:cNvSpPr>
+            <a:spLocks noGrp="1"/>
+          </p:cNvSpPr>
+          <p:nvPr>
+            <p:ph type="title"/>
+          </p:nvPr>
+        </p:nvSpPr>
+        <p:spPr/>
+        <p:txBody>
+          <a:bodyPr/>
+          <a:lstStyle/>
+          <a:p>
+            <a:r>
+              <a:rPr lang="en-US" dirty="0"/>
+              <a:t>Reading Review</a:t>
+            </a:r>
+          </a:p>
+        </p:txBody>
+      </p:sp>
+      <p:sp>
+        <p:nvSpPr>
+          <p:cNvPr id="3" name="Text Placeholder 2">
+            <a:extLst>
+              <a:ext uri="{FF2B5EF4-FFF2-40B4-BE49-F238E27FC236}">
+                <a16:creationId xmlns:a16="http://schemas.microsoft.com/office/drawing/2014/main" id="{9E4E69B5-48ED-4943-9539-44D79E4A7546}"/>
+              </a:ext>
+            </a:extLst>
+          </p:cNvPr>
+          <p:cNvSpPr>
+            <a:spLocks noGrp="1"/>
+          </p:cNvSpPr>
+          <p:nvPr>
+            <p:ph type="body" idx="1"/>
+          </p:nvPr>
+        </p:nvSpPr>
+        <p:spPr>
+          <a:xfrm>
+            <a:off x="628076" y="1920725"/>
+            <a:ext cx="3668154" cy="1015467"/>
+          </a:xfrm>
+        </p:spPr>
+        <p:txBody>
+          <a:bodyPr/>
+          <a:lstStyle/>
+          <a:p>
+            <a:r>
+              <a:rPr lang="en-US" dirty="0"/>
+              <a:t>Given the file:</a:t>
+            </a:r>
+          </a:p>
+          <a:p>
+            <a:pPr lvl="1"/>
+            <a:r>
+              <a:rPr lang="en-US" dirty="0"/>
+              <a:t>What is returned?</a:t>
+            </a:r>
+          </a:p>
+        </p:txBody>
+      </p:sp>
+      <p:sp>
+        <p:nvSpPr>
+          <p:cNvPr id="4" name="Rectangle 1">
+            <a:extLst>
+              <a:ext uri="{FF2B5EF4-FFF2-40B4-BE49-F238E27FC236}">
+                <a16:creationId xmlns:a16="http://schemas.microsoft.com/office/drawing/2014/main" id="{4BB3FE0F-8BBB-4FDE-9006-DF2A5EEB1632}"/>
+              </a:ext>
+            </a:extLst>
+          </p:cNvPr>
+          <p:cNvSpPr>
+            <a:spLocks noChangeArrowheads="1"/>
+          </p:cNvSpPr>
+          <p:nvPr/>
+        </p:nvSpPr>
+        <p:spPr bwMode="auto">
+          <a:xfrm>
+            <a:off x="8011886" y="2815771"/>
+            <a:ext cx="5312190" cy="1569660"/>
+          </a:xfrm>
+          <a:prstGeom prst="rect">
+            <a:avLst/>
+          </a:prstGeom>
+          <a:noFill/>
+          <a:ln>
+            <a:noFill/>
+          </a:ln>
+          <a:effectLst/>
+        </p:spPr>
+        <p:txBody>
+          <a:bodyPr vert="horz" wrap="square" lIns="91440" tIns="45720" rIns="91440" bIns="45720" numCol="1" anchor="ctr" anchorCtr="0" compatLnSpc="1">
+            <a:prstTxWarp prst="textNoShape">
+              <a:avLst/>
+            </a:prstTxWarp>
+            <a:spAutoFit/>
+          </a:bodyPr>
+          <a:lstStyle/>
+          <a:p>
+            <a:pPr marL="0" marR="0" lvl="0" indent="0" algn="l" defTabSz="914400" rtl="0" eaLnBrk="0" fontAlgn="base" latinLnBrk="0" hangingPunct="0">
+              <a:lnSpc>
+                <a:spcPct val="100000"/>
+              </a:lnSpc>
+              <a:spcBef>
+                <a:spcPct val="0"/>
+              </a:spcBef>
+              <a:spcAft>
+                <a:spcPct val="0"/>
+              </a:spcAft>
+              <a:buClrTx/>
+              <a:buSzTx/>
+              <a:buFontTx/>
+              <a:buNone/>
+              <a:tabLst/>
+            </a:pPr>
+            <a:r>
+              <a:rPr kumimoji="0" lang="en-US" altLang="en-US" sz="2400" b="1" i="0" u="none" strike="noStrike" cap="none" normalizeH="0" baseline="0" dirty="0">
+                <a:ln>
+                  <a:noFill/>
+                </a:ln>
+                <a:solidFill>
+                  <a:srgbClr val="000080"/>
+                </a:solidFill>
+                <a:effectLst/>
+                <a:latin typeface="JetBrains Mono"/>
+              </a:rPr>
+              <a:t>def </a:t>
+            </a:r>
+            <a:r>
+              <a:rPr kumimoji="0" lang="en-US" altLang="en-US" sz="2400" b="0" i="0" u="none" strike="noStrike" cap="none" normalizeH="0" baseline="0" dirty="0" err="1">
+                <a:ln>
+                  <a:noFill/>
+                </a:ln>
+                <a:solidFill>
+                  <a:srgbClr val="000000"/>
+                </a:solidFill>
+                <a:effectLst/>
+                <a:latin typeface="JetBrains Mono"/>
+              </a:rPr>
+              <a:t>line_counter</a:t>
+            </a:r>
+            <a:r>
+              <a:rPr kumimoji="0" lang="en-US" altLang="en-US" sz="2400" b="0" i="0" u="none" strike="noStrike" cap="none" normalizeH="0" baseline="0" dirty="0">
+                <a:ln>
+                  <a:noFill/>
+                </a:ln>
+                <a:solidFill>
+                  <a:srgbClr val="000000"/>
+                </a:solidFill>
+                <a:effectLst/>
+                <a:latin typeface="JetBrains Mono"/>
+              </a:rPr>
+              <a:t>(filename):</a:t>
+            </a:r>
+            <a:br>
+              <a:rPr kumimoji="0" lang="en-US" altLang="en-US" sz="2400" b="0" i="0" u="none" strike="noStrike" cap="none" normalizeH="0" baseline="0" dirty="0">
+                <a:ln>
+                  <a:noFill/>
+                </a:ln>
+                <a:solidFill>
+                  <a:srgbClr val="000000"/>
+                </a:solidFill>
+                <a:effectLst/>
+                <a:latin typeface="JetBrains Mono"/>
+              </a:rPr>
+            </a:br>
+            <a:r>
+              <a:rPr kumimoji="0" lang="en-US" altLang="en-US" sz="2400" b="0" i="0" u="none" strike="noStrike" cap="none" normalizeH="0" baseline="0" dirty="0">
+                <a:ln>
+                  <a:noFill/>
+                </a:ln>
+                <a:solidFill>
+                  <a:srgbClr val="000000"/>
+                </a:solidFill>
+                <a:effectLst/>
+                <a:latin typeface="JetBrains Mono"/>
+              </a:rPr>
+              <a:t>    </a:t>
+            </a:r>
+            <a:r>
+              <a:rPr kumimoji="0" lang="en-US" altLang="en-US" sz="2400" b="1" i="0" u="none" strike="noStrike" cap="none" normalizeH="0" baseline="0" dirty="0">
+                <a:ln>
+                  <a:noFill/>
+                </a:ln>
+                <a:solidFill>
+                  <a:srgbClr val="000080"/>
+                </a:solidFill>
+                <a:effectLst/>
+                <a:latin typeface="JetBrains Mono"/>
+              </a:rPr>
+              <a:t>with </a:t>
+            </a:r>
+            <a:r>
+              <a:rPr kumimoji="0" lang="en-US" altLang="en-US" sz="2400" b="0" i="0" u="none" strike="noStrike" cap="none" normalizeH="0" baseline="0" dirty="0">
+                <a:ln>
+                  <a:noFill/>
+                </a:ln>
+                <a:solidFill>
+                  <a:srgbClr val="000000"/>
+                </a:solidFill>
+                <a:effectLst/>
+                <a:latin typeface="JetBrains Mono"/>
+              </a:rPr>
+              <a:t>open(filename, </a:t>
+            </a:r>
+            <a:r>
+              <a:rPr kumimoji="0" lang="en-US" altLang="en-US" sz="2400" b="1" i="0" u="none" strike="noStrike" cap="none" normalizeH="0" baseline="0" dirty="0">
+                <a:ln>
+                  <a:noFill/>
+                </a:ln>
+                <a:solidFill>
+                  <a:srgbClr val="008000"/>
+                </a:solidFill>
+                <a:effectLst/>
+                <a:latin typeface="JetBrains Mono"/>
+              </a:rPr>
+              <a:t>'r'</a:t>
+            </a:r>
+            <a:r>
+              <a:rPr kumimoji="0" lang="en-US" altLang="en-US" sz="2400" b="0" i="0" u="none" strike="noStrike" cap="none" normalizeH="0" baseline="0" dirty="0">
+                <a:ln>
+                  <a:noFill/>
+                </a:ln>
+                <a:solidFill>
+                  <a:srgbClr val="000000"/>
+                </a:solidFill>
+                <a:effectLst/>
+                <a:latin typeface="JetBrains Mono"/>
+              </a:rPr>
+              <a:t>) </a:t>
+            </a:r>
+            <a:r>
+              <a:rPr kumimoji="0" lang="en-US" altLang="en-US" sz="2400" b="1" i="0" u="none" strike="noStrike" cap="none" normalizeH="0" baseline="0" dirty="0">
+                <a:ln>
+                  <a:noFill/>
+                </a:ln>
+                <a:solidFill>
+                  <a:srgbClr val="000080"/>
+                </a:solidFill>
+                <a:effectLst/>
+                <a:latin typeface="JetBrains Mono"/>
+              </a:rPr>
+              <a:t>as </a:t>
+            </a:r>
+            <a:r>
+              <a:rPr kumimoji="0" lang="en-US" altLang="en-US" sz="2400" b="0" i="0" u="none" strike="noStrike" cap="none" normalizeH="0" baseline="0" dirty="0" err="1">
+                <a:ln>
+                  <a:noFill/>
+                </a:ln>
+                <a:solidFill>
+                  <a:srgbClr val="000000"/>
+                </a:solidFill>
+                <a:effectLst/>
+                <a:latin typeface="JetBrains Mono"/>
+              </a:rPr>
+              <a:t>myfile</a:t>
+            </a:r>
+            <a:r>
+              <a:rPr kumimoji="0" lang="en-US" altLang="en-US" sz="2400" b="0" i="0" u="none" strike="noStrike" cap="none" normalizeH="0" baseline="0" dirty="0">
+                <a:ln>
+                  <a:noFill/>
+                </a:ln>
+                <a:solidFill>
+                  <a:srgbClr val="000000"/>
+                </a:solidFill>
+                <a:effectLst/>
+                <a:latin typeface="JetBrains Mono"/>
+              </a:rPr>
+              <a:t>:</a:t>
+            </a:r>
+            <a:br>
+              <a:rPr kumimoji="0" lang="en-US" altLang="en-US" sz="2400" b="0" i="0" u="none" strike="noStrike" cap="none" normalizeH="0" baseline="0" dirty="0">
+                <a:ln>
+                  <a:noFill/>
+                </a:ln>
+                <a:solidFill>
+                  <a:srgbClr val="000000"/>
+                </a:solidFill>
+                <a:effectLst/>
+                <a:latin typeface="JetBrains Mono"/>
+              </a:rPr>
+            </a:br>
+            <a:r>
+              <a:rPr kumimoji="0" lang="en-US" altLang="en-US" sz="2400" b="0" i="0" u="none" strike="noStrike" cap="none" normalizeH="0" baseline="0" dirty="0">
+                <a:ln>
+                  <a:noFill/>
+                </a:ln>
+                <a:solidFill>
+                  <a:srgbClr val="000000"/>
+                </a:solidFill>
+                <a:effectLst/>
+                <a:latin typeface="JetBrains Mono"/>
+              </a:rPr>
+              <a:t>        lines = </a:t>
+            </a:r>
+            <a:r>
+              <a:rPr kumimoji="0" lang="en-US" altLang="en-US" sz="2400" b="0" i="0" u="none" strike="noStrike" cap="none" normalizeH="0" baseline="0" dirty="0" err="1">
+                <a:ln>
+                  <a:noFill/>
+                </a:ln>
+                <a:solidFill>
+                  <a:srgbClr val="000000"/>
+                </a:solidFill>
+                <a:effectLst/>
+                <a:latin typeface="JetBrains Mono"/>
+              </a:rPr>
+              <a:t>myfile.readlines</a:t>
+            </a:r>
+            <a:r>
+              <a:rPr kumimoji="0" lang="en-US" altLang="en-US" sz="2400" b="0" i="0" u="none" strike="noStrike" cap="none" normalizeH="0" baseline="0" dirty="0">
+                <a:ln>
+                  <a:noFill/>
+                </a:ln>
+                <a:solidFill>
+                  <a:srgbClr val="000000"/>
+                </a:solidFill>
+                <a:effectLst/>
+                <a:latin typeface="JetBrains Mono"/>
+              </a:rPr>
+              <a:t>()</a:t>
+            </a:r>
+            <a:br>
+              <a:rPr kumimoji="0" lang="en-US" altLang="en-US" sz="2400" b="0" i="0" u="none" strike="noStrike" cap="none" normalizeH="0" baseline="0" dirty="0">
+                <a:ln>
+                  <a:noFill/>
+                </a:ln>
+                <a:solidFill>
+                  <a:srgbClr val="000000"/>
+                </a:solidFill>
+                <a:effectLst/>
+                <a:latin typeface="JetBrains Mono"/>
+              </a:rPr>
+            </a:br>
+            <a:r>
+              <a:rPr kumimoji="0" lang="en-US" altLang="en-US" sz="2400" b="0" i="0" u="none" strike="noStrike" cap="none" normalizeH="0" baseline="0" dirty="0">
+                <a:ln>
+                  <a:noFill/>
+                </a:ln>
+                <a:solidFill>
+                  <a:srgbClr val="000000"/>
+                </a:solidFill>
+                <a:effectLst/>
+                <a:latin typeface="JetBrains Mono"/>
+              </a:rPr>
+              <a:t>        </a:t>
+            </a:r>
+            <a:r>
+              <a:rPr kumimoji="0" lang="en-US" altLang="en-US" sz="2400" b="1" i="0" u="none" strike="noStrike" cap="none" normalizeH="0" baseline="0" dirty="0">
+                <a:ln>
+                  <a:noFill/>
+                </a:ln>
+                <a:solidFill>
+                  <a:srgbClr val="000080"/>
+                </a:solidFill>
+                <a:effectLst/>
+                <a:latin typeface="JetBrains Mono"/>
+              </a:rPr>
+              <a:t>return </a:t>
+            </a:r>
+            <a:r>
+              <a:rPr kumimoji="0" lang="en-US" altLang="en-US" sz="2400" b="0" i="0" u="none" strike="noStrike" cap="none" normalizeH="0" baseline="0" dirty="0" err="1">
+                <a:ln>
+                  <a:noFill/>
+                </a:ln>
+                <a:solidFill>
+                  <a:srgbClr val="000000"/>
+                </a:solidFill>
+                <a:effectLst/>
+                <a:latin typeface="JetBrains Mono"/>
+              </a:rPr>
+              <a:t>len</a:t>
+            </a:r>
+            <a:r>
+              <a:rPr kumimoji="0" lang="en-US" altLang="en-US" sz="2400" b="0" i="0" u="none" strike="noStrike" cap="none" normalizeH="0" baseline="0" dirty="0">
+                <a:ln>
+                  <a:noFill/>
+                </a:ln>
+                <a:solidFill>
+                  <a:srgbClr val="000000"/>
+                </a:solidFill>
+                <a:effectLst/>
+                <a:latin typeface="JetBrains Mono"/>
+              </a:rPr>
+              <a:t>(lines)</a:t>
+            </a:r>
+            <a:endParaRPr kumimoji="0" lang="en-US" altLang="en-US" sz="2400" b="0" i="0" u="none" strike="noStrike" cap="none" normalizeH="0" baseline="0" dirty="0">
+              <a:ln>
+                <a:noFill/>
+              </a:ln>
+              <a:solidFill>
+                <a:schemeClr val="tx1"/>
+              </a:solidFill>
+              <a:effectLst/>
+              <a:latin typeface="Arial" panose="020B0604020202020204" pitchFamily="34" charset="0"/>
+            </a:endParaRPr>
+          </a:p>
+        </p:txBody>
+      </p:sp>
+      <p:sp>
+        <p:nvSpPr>
+          <p:cNvPr id="5" name="Rectangle: Top Corners One Rounded and One Snipped 4">
+            <a:extLst>
+              <a:ext uri="{FF2B5EF4-FFF2-40B4-BE49-F238E27FC236}">
+                <a16:creationId xmlns:a16="http://schemas.microsoft.com/office/drawing/2014/main" id="{B9AAD83A-5BB6-4D04-9798-E18259E17CD0}"/>
+              </a:ext>
+            </a:extLst>
+          </p:cNvPr>
+          <p:cNvSpPr/>
+          <p:nvPr/>
+        </p:nvSpPr>
+        <p:spPr>
+          <a:xfrm>
+            <a:off x="8011886" y="751389"/>
+            <a:ext cx="4804228" cy="1538514"/>
+          </a:xfrm>
+          <a:prstGeom prst="snipRoundRect">
+            <a:avLst/>
+          </a:prstGeom>
+          <a:solidFill>
+            <a:schemeClr val="accent2"/>
+          </a:solidFill>
+          <a:ln>
+            <a:noFill/>
+          </a:ln>
+          <a:effectLst/>
+        </p:spPr>
+        <p:style>
+          <a:lnRef idx="1">
+            <a:schemeClr val="accent1"/>
+          </a:lnRef>
+          <a:fillRef idx="3">
+            <a:schemeClr val="accent1"/>
+          </a:fillRef>
+          <a:effectRef idx="2">
+            <a:schemeClr val="accent1"/>
+          </a:effectRef>
+          <a:fontRef idx="minor">
+            <a:schemeClr val="lt1"/>
+          </a:fontRef>
+        </p:style>
+        <p:txBody>
+          <a:bodyPr lIns="274320" tIns="182880" rIns="274320" bIns="182880" rtlCol="0" anchor="ctr"/>
+          <a:lstStyle/>
+          <a:p>
+            <a:r>
+              <a:rPr kumimoji="0" lang="en-US" altLang="en-US" sz="2000" b="0" i="0" u="none" strike="noStrike" cap="none" normalizeH="0" baseline="0" dirty="0" err="1">
+                <a:ln>
+                  <a:noFill/>
+                </a:ln>
+                <a:solidFill>
+                  <a:srgbClr val="000000"/>
+                </a:solidFill>
+                <a:effectLst/>
+                <a:latin typeface="JetBrains Mono"/>
+              </a:rPr>
+              <a:t>Mark,Biology,Math,Chemistry,History</a:t>
+            </a:r>
+            <a:br>
+              <a:rPr kumimoji="0" lang="en-US" altLang="en-US" sz="2000" b="0" i="0" u="none" strike="noStrike" cap="none" normalizeH="0" baseline="0" dirty="0">
+                <a:ln>
+                  <a:noFill/>
+                </a:ln>
+                <a:solidFill>
+                  <a:srgbClr val="000000"/>
+                </a:solidFill>
+                <a:effectLst/>
+                <a:latin typeface="JetBrains Mono"/>
+              </a:rPr>
+            </a:br>
+            <a:r>
+              <a:rPr kumimoji="0" lang="en-US" altLang="en-US" sz="2000" b="0" i="0" u="none" strike="noStrike" cap="none" normalizeH="0" baseline="0" dirty="0" err="1">
+                <a:ln>
+                  <a:noFill/>
+                </a:ln>
+                <a:solidFill>
+                  <a:srgbClr val="000000"/>
+                </a:solidFill>
+                <a:effectLst/>
+                <a:latin typeface="JetBrains Mono"/>
+              </a:rPr>
+              <a:t>John,Math,Chemistry,Art,Gym</a:t>
+            </a:r>
+            <a:br>
+              <a:rPr kumimoji="0" lang="en-US" altLang="en-US" sz="2000" b="0" i="0" u="none" strike="noStrike" cap="none" normalizeH="0" baseline="0" dirty="0">
+                <a:ln>
+                  <a:noFill/>
+                </a:ln>
+                <a:solidFill>
+                  <a:srgbClr val="000000"/>
+                </a:solidFill>
+                <a:effectLst/>
+                <a:latin typeface="JetBrains Mono"/>
+              </a:rPr>
+            </a:br>
+            <a:r>
+              <a:rPr kumimoji="0" lang="en-US" altLang="en-US" sz="2000" b="0" i="0" u="none" strike="noStrike" cap="none" normalizeH="0" baseline="0" dirty="0" err="1">
+                <a:ln>
+                  <a:noFill/>
+                </a:ln>
+                <a:solidFill>
+                  <a:srgbClr val="000000"/>
+                </a:solidFill>
+                <a:effectLst/>
+                <a:latin typeface="JetBrains Mono"/>
+              </a:rPr>
+              <a:t>Sarah,Chemistry,Art,Math,English</a:t>
+            </a:r>
+            <a:br>
+              <a:rPr kumimoji="0" lang="en-US" altLang="en-US" sz="2000" b="0" i="0" u="none" strike="noStrike" cap="none" normalizeH="0" baseline="0" dirty="0">
+                <a:ln>
+                  <a:noFill/>
+                </a:ln>
+                <a:solidFill>
+                  <a:srgbClr val="000000"/>
+                </a:solidFill>
+                <a:effectLst/>
+                <a:latin typeface="JetBrains Mono"/>
+              </a:rPr>
+            </a:br>
+            <a:r>
+              <a:rPr kumimoji="0" lang="en-US" altLang="en-US" sz="2000" b="0" i="0" u="none" strike="noStrike" cap="none" normalizeH="0" baseline="0" dirty="0" err="1">
+                <a:ln>
+                  <a:noFill/>
+                </a:ln>
+                <a:solidFill>
+                  <a:srgbClr val="000000"/>
+                </a:solidFill>
+                <a:effectLst/>
+                <a:latin typeface="JetBrains Mono"/>
+              </a:rPr>
+              <a:t>Annie,English,Art,Biology,Gym</a:t>
+            </a:r>
+            <a:endParaRPr kumimoji="0" lang="en-US" altLang="en-US" sz="4800" b="0" i="0" u="none" strike="noStrike" cap="none" normalizeH="0" baseline="0" dirty="0">
+              <a:ln>
+                <a:noFill/>
+              </a:ln>
+              <a:solidFill>
+                <a:schemeClr val="tx1"/>
+              </a:solidFill>
+              <a:effectLst/>
+              <a:latin typeface="Arial" panose="020B0604020202020204" pitchFamily="34" charset="0"/>
+            </a:endParaRPr>
+          </a:p>
+          <a:p>
+            <a:endParaRPr lang="en-US" dirty="0">
+              <a:latin typeface="Proxima Nova" charset="0"/>
+              <a:ea typeface="Proxima Nova" charset="0"/>
+              <a:cs typeface="Proxima Nova" charset="0"/>
+            </a:endParaRPr>
+          </a:p>
+        </p:txBody>
+      </p:sp>
+      <p:sp>
+        <p:nvSpPr>
+          <p:cNvPr id="6" name="Rectangle 2">
+            <a:extLst>
+              <a:ext uri="{FF2B5EF4-FFF2-40B4-BE49-F238E27FC236}">
+                <a16:creationId xmlns:a16="http://schemas.microsoft.com/office/drawing/2014/main" id="{61A744C4-00DA-45D2-B48A-6A8B12486795}"/>
+              </a:ext>
+            </a:extLst>
+          </p:cNvPr>
+          <p:cNvSpPr>
+            <a:spLocks noChangeArrowheads="1"/>
+          </p:cNvSpPr>
+          <p:nvPr/>
+        </p:nvSpPr>
+        <p:spPr bwMode="auto">
+          <a:xfrm>
+            <a:off x="0" y="43934"/>
+            <a:ext cx="184731" cy="369332"/>
+          </a:xfrm>
+          <a:prstGeom prst="rect">
+            <a:avLst/>
+          </a:prstGeom>
+          <a:solidFill>
+            <a:srgbClr val="FFFFFF"/>
+          </a:solidFill>
+          <a:ln>
+            <a:noFill/>
+          </a:ln>
+          <a:effectLst/>
+          <a:extLst>
+            <a:ext uri="{91240B29-F687-4F45-9708-019B960494DF}">
+              <a14:hiddenLine xmlns:a14="http://schemas.microsoft.com/office/drawing/2010/main" w="9525">
+                <a:solidFill>
+                  <a:schemeClr val="tx1"/>
+                </a:solidFill>
+                <a:miter lim="800000"/>
+                <a:headEnd/>
+                <a:tailEnd/>
+              </a14:hiddenLine>
+            </a:ext>
+            <a:ext uri="{AF507438-7753-43E0-B8FC-AC1667EBCBE1}">
+              <a14:hiddenEffects xmlns:a14="http://schemas.microsoft.com/office/drawing/2010/main">
+                <a:effectLst>
+                  <a:outerShdw dist="35921" dir="2700000" algn="ctr" rotWithShape="0">
+                    <a:schemeClr val="bg2"/>
+                  </a:outerShdw>
+                </a:effectLst>
+              </a14:hiddenEffects>
+            </a:ext>
+          </a:extLst>
+        </p:spPr>
+        <p:txBody>
+          <a:bodyPr vert="horz" wrap="none" lIns="91440" tIns="45720" rIns="91440" bIns="45720" numCol="1" anchor="ctr" anchorCtr="0" compatLnSpc="1">
+            <a:prstTxWarp prst="textNoShape">
+              <a:avLst/>
+            </a:prstTxWarp>
+            <a:spAutoFit/>
+          </a:bodyPr>
+          <a:lstStyle/>
+          <a:p>
+            <a:pPr marL="0" marR="0" lvl="0" indent="0" algn="l" defTabSz="914400" rtl="0" eaLnBrk="0" fontAlgn="base" latinLnBrk="0" hangingPunct="0">
+              <a:lnSpc>
+                <a:spcPct val="100000"/>
+              </a:lnSpc>
+              <a:spcBef>
+                <a:spcPct val="0"/>
+              </a:spcBef>
+              <a:spcAft>
+                <a:spcPct val="0"/>
+              </a:spcAft>
+              <a:buClrTx/>
+              <a:buSzTx/>
+              <a:buFontTx/>
+              <a:buNone/>
+              <a:tabLst/>
+            </a:pPr>
+            <a:endParaRPr kumimoji="0" lang="en-US" altLang="en-US" sz="1800" b="0" i="0" u="none" strike="noStrike" cap="none" normalizeH="0" baseline="0" dirty="0">
+              <a:ln>
+                <a:noFill/>
+              </a:ln>
+              <a:solidFill>
+                <a:schemeClr val="tx1"/>
+              </a:solidFill>
+              <a:effectLst/>
+              <a:latin typeface="Arial" panose="020B0604020202020204" pitchFamily="34" charset="0"/>
+            </a:endParaRPr>
+          </a:p>
+        </p:txBody>
+      </p:sp>
+      <p:sp>
+        <p:nvSpPr>
+          <p:cNvPr id="7" name="TextBox 6">
+            <a:extLst>
+              <a:ext uri="{FF2B5EF4-FFF2-40B4-BE49-F238E27FC236}">
+                <a16:creationId xmlns:a16="http://schemas.microsoft.com/office/drawing/2014/main" id="{DC2C23CF-1AC7-4738-9EE2-F2D318F54C61}"/>
+              </a:ext>
+            </a:extLst>
+          </p:cNvPr>
+          <p:cNvSpPr txBox="1"/>
+          <p:nvPr/>
+        </p:nvSpPr>
+        <p:spPr>
+          <a:xfrm>
+            <a:off x="4005944" y="2415661"/>
+            <a:ext cx="493486" cy="400110"/>
+          </a:xfrm>
+          <a:prstGeom prst="rect">
+            <a:avLst/>
+          </a:prstGeom>
+          <a:noFill/>
+        </p:spPr>
+        <p:txBody>
+          <a:bodyPr wrap="square" rtlCol="0">
+            <a:spAutoFit/>
+          </a:bodyPr>
+          <a:lstStyle/>
+          <a:p>
+            <a:r>
+              <a:rPr lang="en-US" dirty="0"/>
+              <a:t>4</a:t>
+            </a:r>
+          </a:p>
+        </p:txBody>
+      </p:sp>
+      <p:sp>
+        <p:nvSpPr>
+          <p:cNvPr id="8" name="Text Placeholder 2">
+            <a:extLst>
+              <a:ext uri="{FF2B5EF4-FFF2-40B4-BE49-F238E27FC236}">
+                <a16:creationId xmlns:a16="http://schemas.microsoft.com/office/drawing/2014/main" id="{9529343E-82C4-483B-8B54-036C5D5D3B04}"/>
+              </a:ext>
+            </a:extLst>
+          </p:cNvPr>
+          <p:cNvSpPr txBox="1">
+            <a:spLocks/>
+          </p:cNvSpPr>
+          <p:nvPr/>
+        </p:nvSpPr>
+        <p:spPr>
+          <a:xfrm>
+            <a:off x="493524" y="3774247"/>
+            <a:ext cx="7518362" cy="3246763"/>
+          </a:xfrm>
+          <a:prstGeom prst="rect">
+            <a:avLst/>
+          </a:prstGeom>
+          <a:noFill/>
+          <a:ln>
+            <a:noFill/>
+          </a:ln>
+        </p:spPr>
+        <p:txBody>
+          <a:bodyPr spcFirstLastPara="1" vert="horz" wrap="square" lIns="60500" tIns="60500" rIns="60500" bIns="60500" rtlCol="0" anchor="t" anchorCtr="0">
+            <a:noAutofit/>
+          </a:bodyPr>
+          <a:lstStyle>
+            <a:lvl1pPr marL="690875" marR="0" lvl="0" indent="-460583" algn="l" defTabSz="699614" rtl="0" eaLnBrk="1" latinLnBrk="0" hangingPunct="1">
+              <a:lnSpc>
+                <a:spcPct val="120000"/>
+              </a:lnSpc>
+              <a:spcBef>
+                <a:spcPts val="604"/>
+              </a:spcBef>
+              <a:spcAft>
+                <a:spcPts val="0"/>
+              </a:spcAft>
+              <a:buClr>
+                <a:srgbClr val="000000"/>
+              </a:buClr>
+              <a:buSzPts val="1200"/>
+              <a:buFont typeface="Arial"/>
+              <a:buChar char="•"/>
+              <a:defRPr sz="1813" b="0" i="0" u="none" strike="noStrike" kern="1200" cap="none">
+                <a:solidFill>
+                  <a:srgbClr val="000000"/>
+                </a:solidFill>
+                <a:latin typeface="Proxima Nova"/>
+                <a:ea typeface="Proxima Nova"/>
+                <a:cs typeface="Proxima Nova"/>
+                <a:sym typeface="Proxima Nova"/>
+              </a:defRPr>
+            </a:lvl1pPr>
+            <a:lvl2pPr marL="1381750" marR="0" lvl="1" indent="-450988" algn="l" defTabSz="699614" rtl="0" eaLnBrk="1" latinLnBrk="0" hangingPunct="1">
+              <a:lnSpc>
+                <a:spcPct val="120000"/>
+              </a:lnSpc>
+              <a:spcBef>
+                <a:spcPts val="604"/>
+              </a:spcBef>
+              <a:spcAft>
+                <a:spcPts val="0"/>
+              </a:spcAft>
+              <a:buClr>
+                <a:srgbClr val="000000"/>
+              </a:buClr>
+              <a:buSzPts val="1100"/>
+              <a:buFont typeface="Arial"/>
+              <a:buChar char="–"/>
+              <a:defRPr sz="1662" b="0" i="0" u="none" strike="noStrike" kern="1200" cap="none">
+                <a:solidFill>
+                  <a:srgbClr val="000000"/>
+                </a:solidFill>
+                <a:latin typeface="Proxima Nova"/>
+                <a:ea typeface="Proxima Nova"/>
+                <a:cs typeface="Proxima Nova"/>
+                <a:sym typeface="Proxima Nova"/>
+              </a:defRPr>
+            </a:lvl2pPr>
+            <a:lvl3pPr marL="2072625" marR="0" lvl="2" indent="-450988" algn="l" defTabSz="699614" rtl="0" eaLnBrk="1" latinLnBrk="0" hangingPunct="1">
+              <a:lnSpc>
+                <a:spcPct val="120000"/>
+              </a:lnSpc>
+              <a:spcBef>
+                <a:spcPts val="604"/>
+              </a:spcBef>
+              <a:spcAft>
+                <a:spcPts val="0"/>
+              </a:spcAft>
+              <a:buClr>
+                <a:srgbClr val="000000"/>
+              </a:buClr>
+              <a:buSzPts val="1100"/>
+              <a:buFont typeface="Arial"/>
+              <a:buChar char="•"/>
+              <a:defRPr sz="1662" b="0" i="0" u="none" strike="noStrike" kern="1200" cap="none">
+                <a:solidFill>
+                  <a:srgbClr val="000000"/>
+                </a:solidFill>
+                <a:latin typeface="Proxima Nova"/>
+                <a:ea typeface="Proxima Nova"/>
+                <a:cs typeface="Proxima Nova"/>
+                <a:sym typeface="Proxima Nova"/>
+              </a:defRPr>
+            </a:lvl3pPr>
+            <a:lvl4pPr marL="2763500" marR="0" lvl="3" indent="-450988" algn="l" defTabSz="699614" rtl="0" eaLnBrk="1" latinLnBrk="0" hangingPunct="1">
+              <a:lnSpc>
+                <a:spcPct val="120000"/>
+              </a:lnSpc>
+              <a:spcBef>
+                <a:spcPts val="604"/>
+              </a:spcBef>
+              <a:spcAft>
+                <a:spcPts val="0"/>
+              </a:spcAft>
+              <a:buClr>
+                <a:srgbClr val="000000"/>
+              </a:buClr>
+              <a:buSzPts val="1100"/>
+              <a:buFont typeface="Arial"/>
+              <a:buChar char="–"/>
+              <a:defRPr sz="1662" b="0" i="0" u="none" strike="noStrike" kern="1200" cap="none">
+                <a:solidFill>
+                  <a:srgbClr val="000000"/>
+                </a:solidFill>
+                <a:latin typeface="Proxima Nova"/>
+                <a:ea typeface="Proxima Nova"/>
+                <a:cs typeface="Proxima Nova"/>
+                <a:sym typeface="Proxima Nova"/>
+              </a:defRPr>
+            </a:lvl4pPr>
+            <a:lvl5pPr marL="3454375" marR="0" lvl="4" indent="-450988" algn="l" defTabSz="699614" rtl="0" eaLnBrk="1" latinLnBrk="0" hangingPunct="1">
+              <a:spcBef>
+                <a:spcPts val="604"/>
+              </a:spcBef>
+              <a:spcAft>
+                <a:spcPts val="0"/>
+              </a:spcAft>
+              <a:buClr>
+                <a:srgbClr val="000000"/>
+              </a:buClr>
+              <a:buSzPts val="1100"/>
+              <a:buFont typeface="Arial"/>
+              <a:buChar char="»"/>
+              <a:defRPr sz="1662" b="0" i="0" u="none" strike="noStrike" kern="1200" cap="none">
+                <a:solidFill>
+                  <a:srgbClr val="000000"/>
+                </a:solidFill>
+                <a:latin typeface="Source Sans Pro"/>
+                <a:ea typeface="Source Sans Pro"/>
+                <a:cs typeface="Source Sans Pro"/>
+                <a:sym typeface="Source Sans Pro"/>
+              </a:defRPr>
+            </a:lvl5pPr>
+            <a:lvl6pPr marL="4145250" marR="0" lvl="5" indent="-537347" algn="l" defTabSz="699614" rtl="0" eaLnBrk="1" latinLnBrk="0" hangingPunct="1">
+              <a:spcBef>
+                <a:spcPts val="604"/>
+              </a:spcBef>
+              <a:spcAft>
+                <a:spcPts val="0"/>
+              </a:spcAft>
+              <a:buClr>
+                <a:srgbClr val="000000"/>
+              </a:buClr>
+              <a:buSzPts val="2000"/>
+              <a:buFont typeface="Arial"/>
+              <a:buChar char="•"/>
+              <a:defRPr sz="3022" b="0" i="0" u="none" strike="noStrike" kern="1200" cap="none">
+                <a:solidFill>
+                  <a:srgbClr val="000000"/>
+                </a:solidFill>
+                <a:latin typeface="Arial"/>
+                <a:ea typeface="Arial"/>
+                <a:cs typeface="Arial"/>
+                <a:sym typeface="Arial"/>
+              </a:defRPr>
+            </a:lvl6pPr>
+            <a:lvl7pPr marL="4836124" marR="0" lvl="6" indent="-537347" algn="l" defTabSz="699614" rtl="0" eaLnBrk="1" latinLnBrk="0" hangingPunct="1">
+              <a:spcBef>
+                <a:spcPts val="604"/>
+              </a:spcBef>
+              <a:spcAft>
+                <a:spcPts val="0"/>
+              </a:spcAft>
+              <a:buClr>
+                <a:srgbClr val="000000"/>
+              </a:buClr>
+              <a:buSzPts val="2000"/>
+              <a:buFont typeface="Arial"/>
+              <a:buChar char="•"/>
+              <a:defRPr sz="3022" b="0" i="0" u="none" strike="noStrike" kern="1200" cap="none">
+                <a:solidFill>
+                  <a:srgbClr val="000000"/>
+                </a:solidFill>
+                <a:latin typeface="Arial"/>
+                <a:ea typeface="Arial"/>
+                <a:cs typeface="Arial"/>
+                <a:sym typeface="Arial"/>
+              </a:defRPr>
+            </a:lvl7pPr>
+            <a:lvl8pPr marL="5526999" marR="0" lvl="7" indent="-537347" algn="l" defTabSz="699614" rtl="0" eaLnBrk="1" latinLnBrk="0" hangingPunct="1">
+              <a:spcBef>
+                <a:spcPts val="604"/>
+              </a:spcBef>
+              <a:spcAft>
+                <a:spcPts val="0"/>
+              </a:spcAft>
+              <a:buClr>
+                <a:srgbClr val="000000"/>
+              </a:buClr>
+              <a:buSzPts val="2000"/>
+              <a:buFont typeface="Arial"/>
+              <a:buChar char="•"/>
+              <a:defRPr sz="3022" b="0" i="0" u="none" strike="noStrike" kern="1200" cap="none">
+                <a:solidFill>
+                  <a:srgbClr val="000000"/>
+                </a:solidFill>
+                <a:latin typeface="Arial"/>
+                <a:ea typeface="Arial"/>
+                <a:cs typeface="Arial"/>
+                <a:sym typeface="Arial"/>
+              </a:defRPr>
+            </a:lvl8pPr>
+            <a:lvl9pPr marL="6217874" marR="0" lvl="8" indent="-537347" algn="l" defTabSz="699614" rtl="0" eaLnBrk="1" latinLnBrk="0" hangingPunct="1">
+              <a:spcBef>
+                <a:spcPts val="604"/>
+              </a:spcBef>
+              <a:spcAft>
+                <a:spcPts val="0"/>
+              </a:spcAft>
+              <a:buClr>
+                <a:srgbClr val="000000"/>
+              </a:buClr>
+              <a:buSzPts val="2000"/>
+              <a:buFont typeface="Arial"/>
+              <a:buChar char="•"/>
+              <a:defRPr sz="3022" b="0" i="0" u="none" strike="noStrike" kern="1200" cap="none">
+                <a:solidFill>
+                  <a:srgbClr val="000000"/>
+                </a:solidFill>
+                <a:latin typeface="Arial"/>
+                <a:ea typeface="Arial"/>
+                <a:cs typeface="Arial"/>
+                <a:sym typeface="Arial"/>
+              </a:defRPr>
+            </a:lvl9pPr>
+          </a:lstStyle>
+          <a:p>
+            <a:r>
+              <a:rPr lang="en-US" dirty="0"/>
+              <a:t>Bonus question: Given the file to the right, what is the best extension (type) to use?</a:t>
+            </a:r>
+          </a:p>
+          <a:p>
+            <a:pPr lvl="1">
+              <a:buFont typeface="+mj-lt"/>
+              <a:buAutoNum type="alphaUcPeriod"/>
+            </a:pPr>
+            <a:r>
+              <a:rPr lang="en-US" dirty="0"/>
+              <a:t>.txt</a:t>
+            </a:r>
+          </a:p>
+          <a:p>
+            <a:pPr lvl="1">
+              <a:buFont typeface="+mj-lt"/>
+              <a:buAutoNum type="alphaUcPeriod"/>
+            </a:pPr>
+            <a:r>
+              <a:rPr lang="en-US" dirty="0"/>
+              <a:t>.csv</a:t>
+            </a:r>
+          </a:p>
+          <a:p>
+            <a:pPr lvl="1">
+              <a:buFont typeface="+mj-lt"/>
+              <a:buAutoNum type="alphaUcPeriod"/>
+            </a:pPr>
+            <a:r>
+              <a:rPr lang="en-US" dirty="0"/>
+              <a:t>.doc</a:t>
+            </a:r>
+          </a:p>
+          <a:p>
+            <a:pPr lvl="1">
+              <a:buFont typeface="+mj-lt"/>
+              <a:buAutoNum type="alphaUcPeriod"/>
+            </a:pPr>
+            <a:r>
+              <a:rPr lang="en-US" dirty="0"/>
+              <a:t>.word</a:t>
+            </a:r>
+          </a:p>
+        </p:txBody>
+      </p:sp>
+    </p:spTree>
+    <p:extLst>
+      <p:ext uri="{BB962C8B-B14F-4D97-AF65-F5344CB8AC3E}">
+        <p14:creationId xmlns:p14="http://schemas.microsoft.com/office/powerpoint/2010/main" val="2320161049"/>
+      </p:ext>
+    </p:extLst>
+  </p:cSld>
+  <p:clrMapOvr>
+    <a:masterClrMapping/>
+  </p:clrMapOvr>
+  <p:transition>
+    <p:fade/>
+  </p:transition>
+  <p:timing>
+    <p:tnLst>
+      <p:par>
+        <p:cTn id="1" dur="indefinite" restart="never" nodeType="tmRoot">
+          <p:childTnLst>
+            <p:seq concurrent="1" nextAc="seek">
+              <p:cTn id="2" dur="indefinite" nodeType="mainSeq">
+                <p:childTnLst>
+                  <p:par>
+                    <p:cTn id="3" fill="hold">
+                      <p:stCondLst>
+                        <p:cond delay="indefinite"/>
+                      </p:stCondLst>
+                      <p:childTnLst>
+                        <p:par>
+                          <p:cTn id="4" fill="hold">
+                            <p:stCondLst>
+                              <p:cond delay="0"/>
+                            </p:stCondLst>
+                            <p:childTnLst>
+                              <p:par>
+                                <p:cTn id="5" presetID="10" presetClass="entr" presetSubtype="0" fill="hold" grpId="0" nodeType="clickEffect">
+                                  <p:stCondLst>
+                                    <p:cond delay="0"/>
+                                  </p:stCondLst>
+                                  <p:childTnLst>
+                                    <p:set>
+                                      <p:cBhvr>
+                                        <p:cTn id="6" dur="1" fill="hold">
+                                          <p:stCondLst>
+                                            <p:cond delay="0"/>
+                                          </p:stCondLst>
+                                        </p:cTn>
+                                        <p:tgtEl>
+                                          <p:spTgt spid="7"/>
+                                        </p:tgtEl>
+                                        <p:attrNameLst>
+                                          <p:attrName>style.visibility</p:attrName>
+                                        </p:attrNameLst>
+                                      </p:cBhvr>
+                                      <p:to>
+                                        <p:strVal val="visible"/>
+                                      </p:to>
+                                    </p:set>
+                                    <p:animEffect transition="in" filter="fade">
+                                      <p:cBhvr>
+                                        <p:cTn id="7" dur="500"/>
+                                        <p:tgtEl>
+                                          <p:spTgt spid="7"/>
+                                        </p:tgtEl>
+                                      </p:cBhvr>
+                                    </p:animEffect>
+                                  </p:childTnLst>
+                                </p:cTn>
+                              </p:par>
+                            </p:childTnLst>
+                          </p:cTn>
+                        </p:par>
+                      </p:childTnLst>
+                    </p:cTn>
+                  </p:par>
+                  <p:par>
+                    <p:cTn id="8" fill="hold">
+                      <p:stCondLst>
+                        <p:cond delay="indefinite"/>
+                      </p:stCondLst>
+                      <p:childTnLst>
+                        <p:par>
+                          <p:cTn id="9" fill="hold">
+                            <p:stCondLst>
+                              <p:cond delay="0"/>
+                            </p:stCondLst>
+                            <p:childTnLst>
+                              <p:par>
+                                <p:cTn id="10" presetID="42" presetClass="entr" presetSubtype="0" fill="hold" grpId="0" nodeType="clickEffect">
+                                  <p:stCondLst>
+                                    <p:cond delay="0"/>
+                                  </p:stCondLst>
+                                  <p:childTnLst>
+                                    <p:set>
+                                      <p:cBhvr>
+                                        <p:cTn id="11" dur="1" fill="hold">
+                                          <p:stCondLst>
+                                            <p:cond delay="0"/>
+                                          </p:stCondLst>
+                                        </p:cTn>
+                                        <p:tgtEl>
+                                          <p:spTgt spid="8"/>
+                                        </p:tgtEl>
+                                        <p:attrNameLst>
+                                          <p:attrName>style.visibility</p:attrName>
+                                        </p:attrNameLst>
+                                      </p:cBhvr>
+                                      <p:to>
+                                        <p:strVal val="visible"/>
+                                      </p:to>
+                                    </p:set>
+                                    <p:animEffect transition="in" filter="fade">
+                                      <p:cBhvr>
+                                        <p:cTn id="12" dur="1000"/>
+                                        <p:tgtEl>
+                                          <p:spTgt spid="8"/>
+                                        </p:tgtEl>
+                                      </p:cBhvr>
+                                    </p:animEffect>
+                                    <p:anim calcmode="lin" valueType="num">
+                                      <p:cBhvr>
+                                        <p:cTn id="13" dur="1000" fill="hold"/>
+                                        <p:tgtEl>
+                                          <p:spTgt spid="8"/>
+                                        </p:tgtEl>
+                                        <p:attrNameLst>
+                                          <p:attrName>ppt_x</p:attrName>
+                                        </p:attrNameLst>
+                                      </p:cBhvr>
+                                      <p:tavLst>
+                                        <p:tav tm="0">
+                                          <p:val>
+                                            <p:strVal val="#ppt_x"/>
+                                          </p:val>
+                                        </p:tav>
+                                        <p:tav tm="100000">
+                                          <p:val>
+                                            <p:strVal val="#ppt_x"/>
+                                          </p:val>
+                                        </p:tav>
+                                      </p:tavLst>
+                                    </p:anim>
+                                    <p:anim calcmode="lin" valueType="num">
+                                      <p:cBhvr>
+                                        <p:cTn id="14" dur="1000" fill="hold"/>
+                                        <p:tgtEl>
+                                          <p:spTgt spid="8"/>
+                                        </p:tgtEl>
+                                        <p:attrNameLst>
+                                          <p:attrName>ppt_y</p:attrName>
+                                        </p:attrNameLst>
+                                      </p:cBhvr>
+                                      <p:tavLst>
+                                        <p:tav tm="0">
+                                          <p:val>
+                                            <p:strVal val="#ppt_y+.1"/>
+                                          </p:val>
+                                        </p:tav>
+                                        <p:tav tm="100000">
+                                          <p:val>
+                                            <p:strVal val="#ppt_y"/>
+                                          </p:val>
+                                        </p:tav>
+                                      </p:tavLst>
+                                    </p:anim>
+                                  </p:childTnLst>
+                                </p:cTn>
+                              </p:par>
+                            </p:childTnLst>
+                          </p:cTn>
+                        </p:par>
+                      </p:childTnLst>
+                    </p:cTn>
+                  </p:par>
+                </p:childTnLst>
+              </p:cTn>
+              <p:prevCondLst>
+                <p:cond evt="onPrev" delay="0">
+                  <p:tgtEl>
+                    <p:sldTgt/>
+                  </p:tgtEl>
+                </p:cond>
+              </p:prevCondLst>
+              <p:nextCondLst>
+                <p:cond evt="onNext" delay="0">
+                  <p:tgtEl>
+                    <p:sldTgt/>
+                  </p:tgtEl>
+                </p:cond>
+              </p:nextCondLst>
+            </p:seq>
+          </p:childTnLst>
+        </p:cTn>
+      </p:par>
+    </p:tnLst>
+    <p:bldLst>
+      <p:bldP spid="7" grpId="0"/>
+      <p:bldP spid="8" grpId="0"/>
+    </p:bldLst>
+  </p:timing>
+</p:sld>
+</file>
+
+<file path=ppt/slides/slide7.xml><?xml version="1.0" encoding="utf-8"?>
 <p:sld xmlns:a="http://schemas.openxmlformats.org/drawingml/2006/main" xmlns:r="http://schemas.openxmlformats.org/officeDocument/2006/relationships" xmlns:p="http://schemas.openxmlformats.org/presentationml/2006/main">
   <p:cSld>
     <p:spTree>
@@ -9414,7 +11616,7 @@
             </a:r>
             <a:r>
               <a:rPr lang="en-US" dirty="0" err="1"/>
-              <a:t>name.readLines</a:t>
+              <a:t>name.readlines</a:t>
             </a:r>
             <a:r>
               <a:rPr lang="en-US" dirty="0"/>
@@ -9458,7 +11660,7 @@
         </p:nvSpPr>
         <p:spPr>
           <a:xfrm>
-            <a:off x="6056489" y="1772541"/>
+            <a:off x="7183765" y="2126284"/>
             <a:ext cx="3307644" cy="1370097"/>
           </a:xfrm>
           <a:prstGeom prst="rect">
@@ -9958,6 +12160,147 @@
             <a:r>
               <a:rPr lang="en-US" sz="1800" dirty="0"/>
               <a:t>Book 4: Balance</a:t>
+            </a:r>
+          </a:p>
+        </p:txBody>
+      </p:sp>
+      <p:sp>
+        <p:nvSpPr>
+          <p:cNvPr id="7" name="Rectangle 6">
+            <a:extLst>
+              <a:ext uri="{FF2B5EF4-FFF2-40B4-BE49-F238E27FC236}">
+                <a16:creationId xmlns:a16="http://schemas.microsoft.com/office/drawing/2014/main" id="{BBA0919E-8BC0-40C7-AE6C-7014262FD1D6}"/>
+              </a:ext>
+            </a:extLst>
+          </p:cNvPr>
+          <p:cNvSpPr/>
+          <p:nvPr/>
+        </p:nvSpPr>
+        <p:spPr>
+          <a:xfrm>
+            <a:off x="7183765" y="3574103"/>
+            <a:ext cx="3969657" cy="1323439"/>
+          </a:xfrm>
+          <a:prstGeom prst="rect">
+            <a:avLst/>
+          </a:prstGeom>
+        </p:spPr>
+        <p:txBody>
+          <a:bodyPr wrap="square">
+            <a:spAutoFit/>
+          </a:bodyPr>
+          <a:lstStyle/>
+          <a:p>
+            <a:r>
+              <a:rPr lang="en-US" dirty="0">
+                <a:latin typeface="Consolas" panose="020B0609020204030204" pitchFamily="49" charset="0"/>
+                <a:cs typeface="Consolas" panose="020B0609020204030204" pitchFamily="49" charset="0"/>
+              </a:rPr>
+              <a:t>f = </a:t>
+            </a:r>
+            <a:r>
+              <a:rPr lang="en-US" dirty="0">
+                <a:solidFill>
+                  <a:srgbClr val="8888C6"/>
+                </a:solidFill>
+                <a:latin typeface="Consolas" panose="020B0609020204030204" pitchFamily="49" charset="0"/>
+                <a:cs typeface="Consolas" panose="020B0609020204030204" pitchFamily="49" charset="0"/>
+              </a:rPr>
+              <a:t>open</a:t>
+            </a:r>
+            <a:r>
+              <a:rPr lang="en-US" dirty="0">
+                <a:latin typeface="Consolas" panose="020B0609020204030204" pitchFamily="49" charset="0"/>
+                <a:cs typeface="Consolas" panose="020B0609020204030204" pitchFamily="49" charset="0"/>
+              </a:rPr>
+              <a:t>(</a:t>
+            </a:r>
+            <a:r>
+              <a:rPr lang="en-US" dirty="0">
+                <a:solidFill>
+                  <a:srgbClr val="6A8759"/>
+                </a:solidFill>
+                <a:latin typeface="Consolas" panose="020B0609020204030204" pitchFamily="49" charset="0"/>
+                <a:cs typeface="Consolas" panose="020B0609020204030204" pitchFamily="49" charset="0"/>
+              </a:rPr>
+              <a:t>"simple.txt"</a:t>
+            </a:r>
+            <a:r>
+              <a:rPr lang="en-US" dirty="0">
+                <a:latin typeface="Consolas" panose="020B0609020204030204" pitchFamily="49" charset="0"/>
+                <a:cs typeface="Consolas" panose="020B0609020204030204" pitchFamily="49" charset="0"/>
+              </a:rPr>
+              <a:t>)</a:t>
+            </a:r>
+            <a:br>
+              <a:rPr lang="en-US" dirty="0">
+                <a:latin typeface="Consolas" panose="020B0609020204030204" pitchFamily="49" charset="0"/>
+                <a:cs typeface="Consolas" panose="020B0609020204030204" pitchFamily="49" charset="0"/>
+              </a:rPr>
+            </a:br>
+            <a:r>
+              <a:rPr lang="en-US" dirty="0">
+                <a:latin typeface="Consolas" panose="020B0609020204030204" pitchFamily="49" charset="0"/>
+                <a:cs typeface="Consolas" panose="020B0609020204030204" pitchFamily="49" charset="0"/>
+              </a:rPr>
+              <a:t>contents = </a:t>
+            </a:r>
+            <a:r>
+              <a:rPr lang="en-US" dirty="0" err="1">
+                <a:latin typeface="Consolas" panose="020B0609020204030204" pitchFamily="49" charset="0"/>
+                <a:cs typeface="Consolas" panose="020B0609020204030204" pitchFamily="49" charset="0"/>
+              </a:rPr>
+              <a:t>f.readlines</a:t>
+            </a:r>
+            <a:r>
+              <a:rPr lang="en-US" dirty="0">
+                <a:latin typeface="Consolas" panose="020B0609020204030204" pitchFamily="49" charset="0"/>
+                <a:cs typeface="Consolas" panose="020B0609020204030204" pitchFamily="49" charset="0"/>
+              </a:rPr>
+              <a:t>()</a:t>
+            </a:r>
+            <a:br>
+              <a:rPr lang="en-US" dirty="0">
+                <a:latin typeface="Consolas" panose="020B0609020204030204" pitchFamily="49" charset="0"/>
+                <a:cs typeface="Consolas" panose="020B0609020204030204" pitchFamily="49" charset="0"/>
+              </a:rPr>
+            </a:br>
+            <a:r>
+              <a:rPr lang="en-US" dirty="0" err="1">
+                <a:latin typeface="Consolas" panose="020B0609020204030204" pitchFamily="49" charset="0"/>
+                <a:cs typeface="Consolas" panose="020B0609020204030204" pitchFamily="49" charset="0"/>
+              </a:rPr>
+              <a:t>f.close</a:t>
+            </a:r>
+            <a:r>
+              <a:rPr lang="en-US" dirty="0">
+                <a:latin typeface="Consolas" panose="020B0609020204030204" pitchFamily="49" charset="0"/>
+                <a:cs typeface="Consolas" panose="020B0609020204030204" pitchFamily="49" charset="0"/>
+              </a:rPr>
+              <a:t>()</a:t>
+            </a:r>
+            <a:br>
+              <a:rPr lang="en-US" dirty="0">
+                <a:latin typeface="Consolas" panose="020B0609020204030204" pitchFamily="49" charset="0"/>
+                <a:cs typeface="Consolas" panose="020B0609020204030204" pitchFamily="49" charset="0"/>
+              </a:rPr>
+            </a:br>
+            <a:r>
+              <a:rPr lang="en-US" dirty="0">
+                <a:solidFill>
+                  <a:srgbClr val="8888C6"/>
+                </a:solidFill>
+                <a:latin typeface="Consolas" panose="020B0609020204030204" pitchFamily="49" charset="0"/>
+                <a:cs typeface="Consolas" panose="020B0609020204030204" pitchFamily="49" charset="0"/>
+              </a:rPr>
+              <a:t>print</a:t>
+            </a:r>
+            <a:r>
+              <a:rPr lang="en-US" dirty="0">
+                <a:latin typeface="Consolas" panose="020B0609020204030204" pitchFamily="49" charset="0"/>
+                <a:cs typeface="Consolas" panose="020B0609020204030204" pitchFamily="49" charset="0"/>
+              </a:rPr>
+              <a:t>(contents)</a:t>
             </a:r>
           </a:p>
         </p:txBody>
@@ -9987,7 +12330,7 @@
 </p:sld>
 </file>
 
-<file path=ppt/slides/slide6.xml><?xml version="1.0" encoding="utf-8"?>
+<file path=ppt/slides/slide8.xml><?xml version="1.0" encoding="utf-8"?>
 <p:sld xmlns:a="http://schemas.openxmlformats.org/drawingml/2006/main" xmlns:r="http://schemas.openxmlformats.org/officeDocument/2006/relationships" xmlns:p="http://schemas.openxmlformats.org/presentationml/2006/main">
   <p:cSld>
     <p:spTree>
@@ -10512,6 +12855,41 @@
           </a:p>
         </p:txBody>
       </p:sp>
+      <p:sp>
+        <p:nvSpPr>
+          <p:cNvPr id="7" name="TextBox 6">
+            <a:extLst>
+              <a:ext uri="{FF2B5EF4-FFF2-40B4-BE49-F238E27FC236}">
+                <a16:creationId xmlns:a16="http://schemas.microsoft.com/office/drawing/2014/main" id="{25A844CE-DC42-409D-A79E-58ADCFE9A089}"/>
+              </a:ext>
+            </a:extLst>
+          </p:cNvPr>
+          <p:cNvSpPr txBox="1"/>
+          <p:nvPr/>
+        </p:nvSpPr>
+        <p:spPr>
+          <a:xfrm>
+            <a:off x="5994400" y="4334315"/>
+            <a:ext cx="4702628" cy="707886"/>
+          </a:xfrm>
+          <a:prstGeom prst="rect">
+            <a:avLst/>
+          </a:prstGeom>
+          <a:noFill/>
+        </p:spPr>
+        <p:txBody>
+          <a:bodyPr wrap="square" rtlCol="0">
+            <a:spAutoFit/>
+          </a:bodyPr>
+          <a:lstStyle/>
+          <a:p>
+            <a:r>
+              <a:rPr lang="en-US" dirty="0"/>
+              <a:t>Using a text editor, write the .csv file equivalent of what you see in the table. </a:t>
+            </a:r>
+          </a:p>
+        </p:txBody>
+      </p:sp>
     </p:spTree>
     <p:extLst>
       <p:ext uri="{BB962C8B-B14F-4D97-AF65-F5344CB8AC3E}">
@@ -10534,10 +12912,208 @@
       </p:transition>
     </mc:Fallback>
   </mc:AlternateContent>
+  <p:timing>
+    <p:tnLst>
+      <p:par>
+        <p:cTn id="1" dur="indefinite" restart="never" nodeType="tmRoot">
+          <p:childTnLst>
+            <p:seq concurrent="1" nextAc="seek">
+              <p:cTn id="2" dur="indefinite" nodeType="mainSeq">
+                <p:childTnLst>
+                  <p:par>
+                    <p:cTn id="3" fill="hold">
+                      <p:stCondLst>
+                        <p:cond delay="indefinite"/>
+                      </p:stCondLst>
+                      <p:childTnLst>
+                        <p:par>
+                          <p:cTn id="4" fill="hold">
+                            <p:stCondLst>
+                              <p:cond delay="0"/>
+                            </p:stCondLst>
+                            <p:childTnLst>
+                              <p:par>
+                                <p:cTn id="5" presetID="2" presetClass="entr" presetSubtype="4" fill="hold" grpId="0" nodeType="clickEffect">
+                                  <p:stCondLst>
+                                    <p:cond delay="0"/>
+                                  </p:stCondLst>
+                                  <p:childTnLst>
+                                    <p:set>
+                                      <p:cBhvr>
+                                        <p:cTn id="6" dur="1" fill="hold">
+                                          <p:stCondLst>
+                                            <p:cond delay="0"/>
+                                          </p:stCondLst>
+                                        </p:cTn>
+                                        <p:tgtEl>
+                                          <p:spTgt spid="5"/>
+                                        </p:tgtEl>
+                                        <p:attrNameLst>
+                                          <p:attrName>style.visibility</p:attrName>
+                                        </p:attrNameLst>
+                                      </p:cBhvr>
+                                      <p:to>
+                                        <p:strVal val="visible"/>
+                                      </p:to>
+                                    </p:set>
+                                    <p:anim calcmode="lin" valueType="num">
+                                      <p:cBhvr additive="base">
+                                        <p:cTn id="7" dur="500" fill="hold"/>
+                                        <p:tgtEl>
+                                          <p:spTgt spid="5"/>
+                                        </p:tgtEl>
+                                        <p:attrNameLst>
+                                          <p:attrName>ppt_x</p:attrName>
+                                        </p:attrNameLst>
+                                      </p:cBhvr>
+                                      <p:tavLst>
+                                        <p:tav tm="0">
+                                          <p:val>
+                                            <p:strVal val="#ppt_x"/>
+                                          </p:val>
+                                        </p:tav>
+                                        <p:tav tm="100000">
+                                          <p:val>
+                                            <p:strVal val="#ppt_x"/>
+                                          </p:val>
+                                        </p:tav>
+                                      </p:tavLst>
+                                    </p:anim>
+                                    <p:anim calcmode="lin" valueType="num">
+                                      <p:cBhvr additive="base">
+                                        <p:cTn id="8" dur="500" fill="hold"/>
+                                        <p:tgtEl>
+                                          <p:spTgt spid="5"/>
+                                        </p:tgtEl>
+                                        <p:attrNameLst>
+                                          <p:attrName>ppt_y</p:attrName>
+                                        </p:attrNameLst>
+                                      </p:cBhvr>
+                                      <p:tavLst>
+                                        <p:tav tm="0">
+                                          <p:val>
+                                            <p:strVal val="1+#ppt_h/2"/>
+                                          </p:val>
+                                        </p:tav>
+                                        <p:tav tm="100000">
+                                          <p:val>
+                                            <p:strVal val="#ppt_y"/>
+                                          </p:val>
+                                        </p:tav>
+                                      </p:tavLst>
+                                    </p:anim>
+                                  </p:childTnLst>
+                                </p:cTn>
+                              </p:par>
+                              <p:par>
+                                <p:cTn id="9" presetID="2" presetClass="entr" presetSubtype="4" fill="hold" grpId="0" nodeType="withEffect">
+                                  <p:stCondLst>
+                                    <p:cond delay="0"/>
+                                  </p:stCondLst>
+                                  <p:childTnLst>
+                                    <p:set>
+                                      <p:cBhvr>
+                                        <p:cTn id="10" dur="1" fill="hold">
+                                          <p:stCondLst>
+                                            <p:cond delay="0"/>
+                                          </p:stCondLst>
+                                        </p:cTn>
+                                        <p:tgtEl>
+                                          <p:spTgt spid="6"/>
+                                        </p:tgtEl>
+                                        <p:attrNameLst>
+                                          <p:attrName>style.visibility</p:attrName>
+                                        </p:attrNameLst>
+                                      </p:cBhvr>
+                                      <p:to>
+                                        <p:strVal val="visible"/>
+                                      </p:to>
+                                    </p:set>
+                                    <p:anim calcmode="lin" valueType="num">
+                                      <p:cBhvr additive="base">
+                                        <p:cTn id="11" dur="500" fill="hold"/>
+                                        <p:tgtEl>
+                                          <p:spTgt spid="6"/>
+                                        </p:tgtEl>
+                                        <p:attrNameLst>
+                                          <p:attrName>ppt_x</p:attrName>
+                                        </p:attrNameLst>
+                                      </p:cBhvr>
+                                      <p:tavLst>
+                                        <p:tav tm="0">
+                                          <p:val>
+                                            <p:strVal val="#ppt_x"/>
+                                          </p:val>
+                                        </p:tav>
+                                        <p:tav tm="100000">
+                                          <p:val>
+                                            <p:strVal val="#ppt_x"/>
+                                          </p:val>
+                                        </p:tav>
+                                      </p:tavLst>
+                                    </p:anim>
+                                    <p:anim calcmode="lin" valueType="num">
+                                      <p:cBhvr additive="base">
+                                        <p:cTn id="12" dur="500" fill="hold"/>
+                                        <p:tgtEl>
+                                          <p:spTgt spid="6"/>
+                                        </p:tgtEl>
+                                        <p:attrNameLst>
+                                          <p:attrName>ppt_y</p:attrName>
+                                        </p:attrNameLst>
+                                      </p:cBhvr>
+                                      <p:tavLst>
+                                        <p:tav tm="0">
+                                          <p:val>
+                                            <p:strVal val="1+#ppt_h/2"/>
+                                          </p:val>
+                                        </p:tav>
+                                        <p:tav tm="100000">
+                                          <p:val>
+                                            <p:strVal val="#ppt_y"/>
+                                          </p:val>
+                                        </p:tav>
+                                      </p:tavLst>
+                                    </p:anim>
+                                  </p:childTnLst>
+                                </p:cTn>
+                              </p:par>
+                            </p:childTnLst>
+                          </p:cTn>
+                        </p:par>
+                      </p:childTnLst>
+                    </p:cTn>
+                  </p:par>
+                </p:childTnLst>
+              </p:cTn>
+              <p:prevCondLst>
+                <p:cond evt="onPrev" delay="0">
+                  <p:tgtEl>
+                    <p:sldTgt/>
+                  </p:tgtEl>
+                </p:cond>
+              </p:prevCondLst>
+              <p:nextCondLst>
+                <p:cond evt="onNext" delay="0">
+                  <p:tgtEl>
+                    <p:sldTgt/>
+                  </p:tgtEl>
+                </p:cond>
+              </p:nextCondLst>
+            </p:seq>
+          </p:childTnLst>
+        </p:cTn>
+      </p:par>
+    </p:tnLst>
+    <p:bldLst>
+      <p:bldP spid="5" grpId="0" animBg="1"/>
+      <p:bldP spid="6" grpId="0"/>
+    </p:bldLst>
+  </p:timing>
 </p:sld>
 </file>
 
-<file path=ppt/slides/slide7.xml><?xml version="1.0" encoding="utf-8"?>
+<file path=ppt/slides/slide9.xml><?xml version="1.0" encoding="utf-8"?>
 <p:sld xmlns:a="http://schemas.openxmlformats.org/drawingml/2006/main" xmlns:r="http://schemas.openxmlformats.org/officeDocument/2006/relationships" xmlns:p="http://schemas.openxmlformats.org/presentationml/2006/main">
   <p:cSld>
     <p:spTree>
@@ -11058,715 +13634,6 @@
     <p:extLst>
       <p:ext uri="{BB962C8B-B14F-4D97-AF65-F5344CB8AC3E}">
         <p14:creationId xmlns:p14="http://schemas.microsoft.com/office/powerpoint/2010/main" val="1878525843"/>
-      </p:ext>
-    </p:extLst>
-  </p:cSld>
-  <p:clrMapOvr>
-    <a:masterClrMapping/>
-  </p:clrMapOvr>
-  <mc:AlternateContent xmlns:mc="http://schemas.openxmlformats.org/markup-compatibility/2006" xmlns:p14="http://schemas.microsoft.com/office/powerpoint/2010/main">
-    <mc:Choice Requires="p14">
-      <p:transition p14:dur="300">
-        <p:fade/>
-      </p:transition>
-    </mc:Choice>
-    <mc:Fallback xmlns="">
-      <p:transition>
-        <p:fade/>
-      </p:transition>
-    </mc:Fallback>
-  </mc:AlternateContent>
-</p:sld>
-</file>
-
-<file path=ppt/slides/slide8.xml><?xml version="1.0" encoding="utf-8"?>
-<p:sld xmlns:a="http://schemas.openxmlformats.org/drawingml/2006/main" xmlns:r="http://schemas.openxmlformats.org/officeDocument/2006/relationships" xmlns:p="http://schemas.openxmlformats.org/presentationml/2006/main">
-  <p:cSld>
-    <p:spTree>
-      <p:nvGrpSpPr>
-        <p:cNvPr id="1" name=""/>
-        <p:cNvGrpSpPr/>
-        <p:nvPr/>
-      </p:nvGrpSpPr>
-      <p:grpSpPr>
-        <a:xfrm>
-          <a:off x="0" y="0"/>
-          <a:ext cx="0" cy="0"/>
-          <a:chOff x="0" y="0"/>
-          <a:chExt cx="0" cy="0"/>
-        </a:xfrm>
-      </p:grpSpPr>
-      <p:sp>
-        <p:nvSpPr>
-          <p:cNvPr id="2" name="Title 1">
-            <a:extLst>
-              <a:ext uri="{FF2B5EF4-FFF2-40B4-BE49-F238E27FC236}">
-                <a16:creationId xmlns:a16="http://schemas.microsoft.com/office/drawing/2014/main" id="{CACDA05E-8C77-2441-AB67-601AE5ACD523}"/>
-              </a:ext>
-            </a:extLst>
-          </p:cNvPr>
-          <p:cNvSpPr>
-            <a:spLocks noGrp="1"/>
-          </p:cNvSpPr>
-          <p:nvPr>
-            <p:ph type="title"/>
-          </p:nvPr>
-        </p:nvSpPr>
-        <p:spPr/>
-        <p:txBody>
-          <a:bodyPr/>
-          <a:lstStyle/>
-          <a:p>
-            <a:r>
-              <a:rPr lang="en-US" dirty="0"/>
-              <a:t>Let’s Code</a:t>
-            </a:r>
-          </a:p>
-        </p:txBody>
-      </p:sp>
-      <p:sp>
-        <p:nvSpPr>
-          <p:cNvPr id="4" name="Rectangle 3">
-            <a:extLst>
-              <a:ext uri="{FF2B5EF4-FFF2-40B4-BE49-F238E27FC236}">
-                <a16:creationId xmlns:a16="http://schemas.microsoft.com/office/drawing/2014/main" id="{B2146367-1280-9A40-9942-114769B07EE5}"/>
-              </a:ext>
-            </a:extLst>
-          </p:cNvPr>
-          <p:cNvSpPr/>
-          <p:nvPr/>
-        </p:nvSpPr>
-        <p:spPr>
-          <a:xfrm>
-            <a:off x="3522134" y="1618910"/>
-            <a:ext cx="8410222" cy="3785652"/>
-          </a:xfrm>
-          <a:prstGeom prst="rect">
-            <a:avLst/>
-          </a:prstGeom>
-        </p:spPr>
-        <p:txBody>
-          <a:bodyPr wrap="square">
-            <a:spAutoFit/>
-          </a:bodyPr>
-          <a:lstStyle/>
-          <a:p>
-            <a:r>
-              <a:rPr lang="en-US" dirty="0">
-                <a:solidFill>
-                  <a:srgbClr val="CC7832"/>
-                </a:solidFill>
-                <a:latin typeface="Consolas" panose="020B0609020204030204" pitchFamily="49" charset="0"/>
-                <a:cs typeface="Consolas" panose="020B0609020204030204" pitchFamily="49" charset="0"/>
-              </a:rPr>
-              <a:t>def  </a:t>
-            </a:r>
-            <a:r>
-              <a:rPr lang="en-US" dirty="0" err="1">
-                <a:solidFill>
-                  <a:srgbClr val="FFC66D"/>
-                </a:solidFill>
-                <a:latin typeface="Consolas" panose="020B0609020204030204" pitchFamily="49" charset="0"/>
-                <a:cs typeface="Consolas" panose="020B0609020204030204" pitchFamily="49" charset="0"/>
-              </a:rPr>
-              <a:t>mob_reader</a:t>
-            </a:r>
-            <a:r>
-              <a:rPr lang="en-US" dirty="0">
-                <a:latin typeface="Consolas" panose="020B0609020204030204" pitchFamily="49" charset="0"/>
-                <a:cs typeface="Consolas" panose="020B0609020204030204" pitchFamily="49" charset="0"/>
-              </a:rPr>
-              <a:t>(filename</a:t>
-            </a:r>
-            <a:r>
-              <a:rPr lang="en-US" dirty="0">
-                <a:solidFill>
-                  <a:srgbClr val="CC7832"/>
-                </a:solidFill>
-                <a:latin typeface="Consolas" panose="020B0609020204030204" pitchFamily="49" charset="0"/>
-                <a:cs typeface="Consolas" panose="020B0609020204030204" pitchFamily="49" charset="0"/>
-              </a:rPr>
-              <a:t>, </a:t>
-            </a:r>
-            <a:r>
-              <a:rPr lang="en-US" dirty="0">
-                <a:latin typeface="Consolas" panose="020B0609020204030204" pitchFamily="49" charset="0"/>
-                <a:cs typeface="Consolas" panose="020B0609020204030204" pitchFamily="49" charset="0"/>
-              </a:rPr>
-              <a:t>name):</a:t>
-            </a:r>
-            <a:br>
-              <a:rPr lang="en-US" dirty="0">
-                <a:latin typeface="Consolas" panose="020B0609020204030204" pitchFamily="49" charset="0"/>
-                <a:cs typeface="Consolas" panose="020B0609020204030204" pitchFamily="49" charset="0"/>
-              </a:rPr>
-            </a:br>
-            <a:r>
-              <a:rPr lang="en-US" dirty="0">
-                <a:latin typeface="Consolas" panose="020B0609020204030204" pitchFamily="49" charset="0"/>
-                <a:cs typeface="Consolas" panose="020B0609020204030204" pitchFamily="49" charset="0"/>
-              </a:rPr>
-              <a:t>    </a:t>
-            </a:r>
-            <a:r>
-              <a:rPr lang="en-US" dirty="0" err="1">
-                <a:latin typeface="Consolas" panose="020B0609020204030204" pitchFamily="49" charset="0"/>
-                <a:cs typeface="Consolas" panose="020B0609020204030204" pitchFamily="49" charset="0"/>
-              </a:rPr>
-              <a:t>moblist</a:t>
-            </a:r>
-            <a:r>
-              <a:rPr lang="en-US" dirty="0">
-                <a:latin typeface="Consolas" panose="020B0609020204030204" pitchFamily="49" charset="0"/>
-                <a:cs typeface="Consolas" panose="020B0609020204030204" pitchFamily="49" charset="0"/>
-              </a:rPr>
-              <a:t> = []</a:t>
-            </a:r>
-            <a:br>
-              <a:rPr lang="en-US" dirty="0">
-                <a:latin typeface="Consolas" panose="020B0609020204030204" pitchFamily="49" charset="0"/>
-                <a:cs typeface="Consolas" panose="020B0609020204030204" pitchFamily="49" charset="0"/>
-              </a:rPr>
-            </a:br>
-            <a:r>
-              <a:rPr lang="en-US" dirty="0">
-                <a:latin typeface="Consolas" panose="020B0609020204030204" pitchFamily="49" charset="0"/>
-                <a:cs typeface="Consolas" panose="020B0609020204030204" pitchFamily="49" charset="0"/>
-              </a:rPr>
-              <a:t>    </a:t>
-            </a:r>
-            <a:r>
-              <a:rPr lang="en-US" dirty="0">
-                <a:solidFill>
-                  <a:srgbClr val="CC7832"/>
-                </a:solidFill>
-                <a:latin typeface="Consolas" panose="020B0609020204030204" pitchFamily="49" charset="0"/>
-                <a:cs typeface="Consolas" panose="020B0609020204030204" pitchFamily="49" charset="0"/>
-              </a:rPr>
-              <a:t>with </a:t>
-            </a:r>
-            <a:r>
-              <a:rPr lang="en-US" dirty="0">
-                <a:solidFill>
-                  <a:srgbClr val="8888C6"/>
-                </a:solidFill>
-                <a:latin typeface="Consolas" panose="020B0609020204030204" pitchFamily="49" charset="0"/>
-                <a:cs typeface="Consolas" panose="020B0609020204030204" pitchFamily="49" charset="0"/>
-              </a:rPr>
-              <a:t>open</a:t>
-            </a:r>
-            <a:r>
-              <a:rPr lang="en-US" dirty="0">
-                <a:latin typeface="Consolas" panose="020B0609020204030204" pitchFamily="49" charset="0"/>
-                <a:cs typeface="Consolas" panose="020B0609020204030204" pitchFamily="49" charset="0"/>
-              </a:rPr>
-              <a:t>(filename)  </a:t>
-            </a:r>
-            <a:r>
-              <a:rPr lang="en-US" dirty="0">
-                <a:solidFill>
-                  <a:srgbClr val="CC7832"/>
-                </a:solidFill>
-                <a:latin typeface="Consolas" panose="020B0609020204030204" pitchFamily="49" charset="0"/>
-                <a:cs typeface="Consolas" panose="020B0609020204030204" pitchFamily="49" charset="0"/>
-              </a:rPr>
-              <a:t>as  </a:t>
-            </a:r>
-            <a:r>
-              <a:rPr lang="en-US" dirty="0" err="1">
-                <a:latin typeface="Consolas" panose="020B0609020204030204" pitchFamily="49" charset="0"/>
-                <a:cs typeface="Consolas" panose="020B0609020204030204" pitchFamily="49" charset="0"/>
-              </a:rPr>
-              <a:t>csvfile</a:t>
-            </a:r>
-            <a:r>
-              <a:rPr lang="en-US" dirty="0">
-                <a:latin typeface="Consolas" panose="020B0609020204030204" pitchFamily="49" charset="0"/>
-                <a:cs typeface="Consolas" panose="020B0609020204030204" pitchFamily="49" charset="0"/>
-              </a:rPr>
-              <a:t>:</a:t>
-            </a:r>
-            <a:br>
-              <a:rPr lang="en-US" dirty="0">
-                <a:latin typeface="Consolas" panose="020B0609020204030204" pitchFamily="49" charset="0"/>
-                <a:cs typeface="Consolas" panose="020B0609020204030204" pitchFamily="49" charset="0"/>
-              </a:rPr>
-            </a:br>
-            <a:r>
-              <a:rPr lang="en-US" dirty="0">
-                <a:latin typeface="Consolas" panose="020B0609020204030204" pitchFamily="49" charset="0"/>
-                <a:cs typeface="Consolas" panose="020B0609020204030204" pitchFamily="49" charset="0"/>
-              </a:rPr>
-              <a:t>        mobs = </a:t>
-            </a:r>
-            <a:r>
-              <a:rPr lang="en-US" dirty="0" err="1">
-                <a:latin typeface="Consolas" panose="020B0609020204030204" pitchFamily="49" charset="0"/>
-                <a:cs typeface="Consolas" panose="020B0609020204030204" pitchFamily="49" charset="0"/>
-              </a:rPr>
-              <a:t>csv.reader</a:t>
-            </a:r>
-            <a:r>
-              <a:rPr lang="en-US" dirty="0">
-                <a:latin typeface="Consolas" panose="020B0609020204030204" pitchFamily="49" charset="0"/>
-                <a:cs typeface="Consolas" panose="020B0609020204030204" pitchFamily="49" charset="0"/>
-              </a:rPr>
-              <a:t>(</a:t>
-            </a:r>
-            <a:r>
-              <a:rPr lang="en-US" dirty="0" err="1">
-                <a:latin typeface="Consolas" panose="020B0609020204030204" pitchFamily="49" charset="0"/>
-                <a:cs typeface="Consolas" panose="020B0609020204030204" pitchFamily="49" charset="0"/>
-              </a:rPr>
-              <a:t>csvfile</a:t>
-            </a:r>
-            <a:r>
-              <a:rPr lang="en-US" dirty="0">
-                <a:latin typeface="Consolas" panose="020B0609020204030204" pitchFamily="49" charset="0"/>
-                <a:cs typeface="Consolas" panose="020B0609020204030204" pitchFamily="49" charset="0"/>
-              </a:rPr>
-              <a:t>)</a:t>
-            </a:r>
-            <a:br>
-              <a:rPr lang="en-US" dirty="0">
-                <a:latin typeface="Consolas" panose="020B0609020204030204" pitchFamily="49" charset="0"/>
-                <a:cs typeface="Consolas" panose="020B0609020204030204" pitchFamily="49" charset="0"/>
-              </a:rPr>
-            </a:br>
-            <a:r>
-              <a:rPr lang="en-US" dirty="0">
-                <a:latin typeface="Consolas" panose="020B0609020204030204" pitchFamily="49" charset="0"/>
-                <a:cs typeface="Consolas" panose="020B0609020204030204" pitchFamily="49" charset="0"/>
-              </a:rPr>
-              <a:t>        first = </a:t>
-            </a:r>
-            <a:r>
-              <a:rPr lang="en-US" dirty="0">
-                <a:solidFill>
-                  <a:srgbClr val="CC7832"/>
-                </a:solidFill>
-                <a:latin typeface="Consolas" panose="020B0609020204030204" pitchFamily="49" charset="0"/>
-                <a:cs typeface="Consolas" panose="020B0609020204030204" pitchFamily="49" charset="0"/>
-              </a:rPr>
-              <a:t>True</a:t>
-            </a:r>
-            <a:br>
-              <a:rPr lang="en-US" dirty="0">
-                <a:solidFill>
-                  <a:srgbClr val="CC7832"/>
-                </a:solidFill>
-                <a:latin typeface="Consolas" panose="020B0609020204030204" pitchFamily="49" charset="0"/>
-                <a:cs typeface="Consolas" panose="020B0609020204030204" pitchFamily="49" charset="0"/>
-              </a:rPr>
-            </a:br>
-            <a:r>
-              <a:rPr lang="en-US" dirty="0">
-                <a:solidFill>
-                  <a:srgbClr val="CC7832"/>
-                </a:solidFill>
-                <a:latin typeface="Consolas" panose="020B0609020204030204" pitchFamily="49" charset="0"/>
-                <a:cs typeface="Consolas" panose="020B0609020204030204" pitchFamily="49" charset="0"/>
-              </a:rPr>
-              <a:t>        for </a:t>
-            </a:r>
-            <a:r>
-              <a:rPr lang="en-US" dirty="0">
-                <a:latin typeface="Consolas" panose="020B0609020204030204" pitchFamily="49" charset="0"/>
-                <a:cs typeface="Consolas" panose="020B0609020204030204" pitchFamily="49" charset="0"/>
-              </a:rPr>
-              <a:t>mob </a:t>
-            </a:r>
-            <a:r>
-              <a:rPr lang="en-US" dirty="0">
-                <a:solidFill>
-                  <a:srgbClr val="CC7832"/>
-                </a:solidFill>
-                <a:latin typeface="Consolas" panose="020B0609020204030204" pitchFamily="49" charset="0"/>
-                <a:cs typeface="Consolas" panose="020B0609020204030204" pitchFamily="49" charset="0"/>
-              </a:rPr>
-              <a:t>in </a:t>
-            </a:r>
-            <a:r>
-              <a:rPr lang="en-US" dirty="0">
-                <a:latin typeface="Consolas" panose="020B0609020204030204" pitchFamily="49" charset="0"/>
-                <a:cs typeface="Consolas" panose="020B0609020204030204" pitchFamily="49" charset="0"/>
-              </a:rPr>
-              <a:t>mobs:</a:t>
-            </a:r>
-            <a:br>
-              <a:rPr lang="en-US" dirty="0">
-                <a:latin typeface="Consolas" panose="020B0609020204030204" pitchFamily="49" charset="0"/>
-                <a:cs typeface="Consolas" panose="020B0609020204030204" pitchFamily="49" charset="0"/>
-              </a:rPr>
-            </a:br>
-            <a:r>
-              <a:rPr lang="en-US" dirty="0">
-                <a:latin typeface="Consolas" panose="020B0609020204030204" pitchFamily="49" charset="0"/>
-                <a:cs typeface="Consolas" panose="020B0609020204030204" pitchFamily="49" charset="0"/>
-              </a:rPr>
-              <a:t>            </a:t>
-            </a:r>
-            <a:r>
-              <a:rPr lang="en-US" dirty="0">
-                <a:solidFill>
-                  <a:srgbClr val="CC7832"/>
-                </a:solidFill>
-                <a:latin typeface="Consolas" panose="020B0609020204030204" pitchFamily="49" charset="0"/>
-                <a:cs typeface="Consolas" panose="020B0609020204030204" pitchFamily="49" charset="0"/>
-              </a:rPr>
-              <a:t>if </a:t>
-            </a:r>
-            <a:r>
-              <a:rPr lang="en-US" dirty="0">
-                <a:latin typeface="Consolas" panose="020B0609020204030204" pitchFamily="49" charset="0"/>
-                <a:cs typeface="Consolas" panose="020B0609020204030204" pitchFamily="49" charset="0"/>
-              </a:rPr>
-              <a:t>first:</a:t>
-            </a:r>
-            <a:br>
-              <a:rPr lang="en-US" dirty="0">
-                <a:latin typeface="Consolas" panose="020B0609020204030204" pitchFamily="49" charset="0"/>
-                <a:cs typeface="Consolas" panose="020B0609020204030204" pitchFamily="49" charset="0"/>
-              </a:rPr>
-            </a:br>
-            <a:r>
-              <a:rPr lang="en-US" dirty="0">
-                <a:latin typeface="Consolas" panose="020B0609020204030204" pitchFamily="49" charset="0"/>
-                <a:cs typeface="Consolas" panose="020B0609020204030204" pitchFamily="49" charset="0"/>
-              </a:rPr>
-              <a:t>                first = </a:t>
-            </a:r>
-            <a:r>
-              <a:rPr lang="en-US" dirty="0">
-                <a:solidFill>
-                  <a:srgbClr val="CC7832"/>
-                </a:solidFill>
-                <a:latin typeface="Consolas" panose="020B0609020204030204" pitchFamily="49" charset="0"/>
-                <a:cs typeface="Consolas" panose="020B0609020204030204" pitchFamily="49" charset="0"/>
-              </a:rPr>
-              <a:t>False</a:t>
-            </a:r>
-            <a:br>
-              <a:rPr lang="en-US" dirty="0">
-                <a:solidFill>
-                  <a:srgbClr val="CC7832"/>
-                </a:solidFill>
-                <a:latin typeface="Consolas" panose="020B0609020204030204" pitchFamily="49" charset="0"/>
-                <a:cs typeface="Consolas" panose="020B0609020204030204" pitchFamily="49" charset="0"/>
-              </a:rPr>
-            </a:br>
-            <a:r>
-              <a:rPr lang="en-US" dirty="0">
-                <a:solidFill>
-                  <a:srgbClr val="CC7832"/>
-                </a:solidFill>
-                <a:latin typeface="Consolas" panose="020B0609020204030204" pitchFamily="49" charset="0"/>
-                <a:cs typeface="Consolas" panose="020B0609020204030204" pitchFamily="49" charset="0"/>
-              </a:rPr>
-              <a:t>                continue </a:t>
-            </a:r>
-            <a:r>
-              <a:rPr lang="en-US" dirty="0">
-                <a:solidFill>
-                  <a:srgbClr val="808080"/>
-                </a:solidFill>
-                <a:latin typeface="Consolas" panose="020B0609020204030204" pitchFamily="49" charset="0"/>
-                <a:cs typeface="Consolas" panose="020B0609020204030204" pitchFamily="49" charset="0"/>
-              </a:rPr>
-              <a:t>#  skip to start of loop</a:t>
-            </a:r>
-            <a:br>
-              <a:rPr lang="en-US" dirty="0">
-                <a:solidFill>
-                  <a:srgbClr val="808080"/>
-                </a:solidFill>
-                <a:latin typeface="Consolas" panose="020B0609020204030204" pitchFamily="49" charset="0"/>
-                <a:cs typeface="Consolas" panose="020B0609020204030204" pitchFamily="49" charset="0"/>
-              </a:rPr>
-            </a:br>
-            <a:r>
-              <a:rPr lang="en-US" dirty="0">
-                <a:solidFill>
-                  <a:srgbClr val="808080"/>
-                </a:solidFill>
-                <a:latin typeface="Consolas" panose="020B0609020204030204" pitchFamily="49" charset="0"/>
-                <a:cs typeface="Consolas" panose="020B0609020204030204" pitchFamily="49" charset="0"/>
-              </a:rPr>
-              <a:t>            </a:t>
-            </a:r>
-            <a:r>
-              <a:rPr lang="en-US" dirty="0">
-                <a:solidFill>
-                  <a:srgbClr val="CC7832"/>
-                </a:solidFill>
-                <a:latin typeface="Consolas" panose="020B0609020204030204" pitchFamily="49" charset="0"/>
-                <a:cs typeface="Consolas" panose="020B0609020204030204" pitchFamily="49" charset="0"/>
-              </a:rPr>
-              <a:t>if </a:t>
-            </a:r>
-            <a:r>
-              <a:rPr lang="en-US" dirty="0">
-                <a:latin typeface="Consolas" panose="020B0609020204030204" pitchFamily="49" charset="0"/>
-                <a:cs typeface="Consolas" panose="020B0609020204030204" pitchFamily="49" charset="0"/>
-              </a:rPr>
-              <a:t>mob[</a:t>
-            </a:r>
-            <a:r>
-              <a:rPr lang="en-US" dirty="0">
-                <a:solidFill>
-                  <a:srgbClr val="6897BB"/>
-                </a:solidFill>
-                <a:latin typeface="Consolas" panose="020B0609020204030204" pitchFamily="49" charset="0"/>
-                <a:cs typeface="Consolas" panose="020B0609020204030204" pitchFamily="49" charset="0"/>
-              </a:rPr>
-              <a:t>0</a:t>
-            </a:r>
-            <a:r>
-              <a:rPr lang="en-US" dirty="0">
-                <a:latin typeface="Consolas" panose="020B0609020204030204" pitchFamily="49" charset="0"/>
-                <a:cs typeface="Consolas" panose="020B0609020204030204" pitchFamily="49" charset="0"/>
-              </a:rPr>
-              <a:t>] == name:</a:t>
-            </a:r>
-            <a:br>
-              <a:rPr lang="en-US" dirty="0">
-                <a:latin typeface="Consolas" panose="020B0609020204030204" pitchFamily="49" charset="0"/>
-                <a:cs typeface="Consolas" panose="020B0609020204030204" pitchFamily="49" charset="0"/>
-              </a:rPr>
-            </a:br>
-            <a:r>
-              <a:rPr lang="en-US" dirty="0">
-                <a:latin typeface="Consolas" panose="020B0609020204030204" pitchFamily="49" charset="0"/>
-                <a:cs typeface="Consolas" panose="020B0609020204030204" pitchFamily="49" charset="0"/>
-              </a:rPr>
-              <a:t>                </a:t>
-            </a:r>
-            <a:r>
-              <a:rPr lang="en-US" dirty="0" err="1">
-                <a:latin typeface="Consolas" panose="020B0609020204030204" pitchFamily="49" charset="0"/>
-                <a:cs typeface="Consolas" panose="020B0609020204030204" pitchFamily="49" charset="0"/>
-              </a:rPr>
-              <a:t>moblist.append</a:t>
-            </a:r>
-            <a:r>
-              <a:rPr lang="en-US" dirty="0">
-                <a:latin typeface="Consolas" panose="020B0609020204030204" pitchFamily="49" charset="0"/>
-                <a:cs typeface="Consolas" panose="020B0609020204030204" pitchFamily="49" charset="0"/>
-              </a:rPr>
-              <a:t>(mob)</a:t>
-            </a:r>
-            <a:br>
-              <a:rPr lang="en-US" dirty="0">
-                <a:latin typeface="Consolas" panose="020B0609020204030204" pitchFamily="49" charset="0"/>
-                <a:cs typeface="Consolas" panose="020B0609020204030204" pitchFamily="49" charset="0"/>
-              </a:rPr>
-            </a:br>
-            <a:r>
-              <a:rPr lang="en-US" dirty="0">
-                <a:latin typeface="Consolas" panose="020B0609020204030204" pitchFamily="49" charset="0"/>
-                <a:cs typeface="Consolas" panose="020B0609020204030204" pitchFamily="49" charset="0"/>
-              </a:rPr>
-              <a:t>    </a:t>
-            </a:r>
-            <a:r>
-              <a:rPr lang="en-US" dirty="0">
-                <a:solidFill>
-                  <a:srgbClr val="CC7832"/>
-                </a:solidFill>
-                <a:latin typeface="Consolas" panose="020B0609020204030204" pitchFamily="49" charset="0"/>
-                <a:cs typeface="Consolas" panose="020B0609020204030204" pitchFamily="49" charset="0"/>
-              </a:rPr>
-              <a:t>return </a:t>
-            </a:r>
-            <a:r>
-              <a:rPr lang="en-US" dirty="0" err="1">
-                <a:latin typeface="Consolas" panose="020B0609020204030204" pitchFamily="49" charset="0"/>
-                <a:cs typeface="Consolas" panose="020B0609020204030204" pitchFamily="49" charset="0"/>
-              </a:rPr>
-              <a:t>moblist</a:t>
-            </a:r>
-            <a:endParaRPr lang="en-US" dirty="0">
-              <a:latin typeface="Consolas" panose="020B0609020204030204" pitchFamily="49" charset="0"/>
-              <a:cs typeface="Consolas" panose="020B0609020204030204" pitchFamily="49" charset="0"/>
-            </a:endParaRPr>
-          </a:p>
-        </p:txBody>
-      </p:sp>
-      <p:sp>
-        <p:nvSpPr>
-          <p:cNvPr id="5" name="Rectangle 4">
-            <a:extLst>
-              <a:ext uri="{FF2B5EF4-FFF2-40B4-BE49-F238E27FC236}">
-                <a16:creationId xmlns:a16="http://schemas.microsoft.com/office/drawing/2014/main" id="{6AAD0EB7-0786-5D44-A825-BDCF6A014C33}"/>
-              </a:ext>
-            </a:extLst>
-          </p:cNvPr>
-          <p:cNvSpPr/>
-          <p:nvPr/>
-        </p:nvSpPr>
-        <p:spPr>
-          <a:xfrm>
-            <a:off x="3522134" y="5491770"/>
-            <a:ext cx="6908800" cy="1323439"/>
-          </a:xfrm>
-          <a:prstGeom prst="rect">
-            <a:avLst/>
-          </a:prstGeom>
-        </p:spPr>
-        <p:txBody>
-          <a:bodyPr>
-            <a:spAutoFit/>
-          </a:bodyPr>
-          <a:lstStyle/>
-          <a:p>
-            <a:r>
-              <a:rPr lang="en-US" dirty="0">
-                <a:solidFill>
-                  <a:srgbClr val="CC7832"/>
-                </a:solidFill>
-                <a:latin typeface="Consolas" panose="020B0609020204030204" pitchFamily="49" charset="0"/>
-                <a:cs typeface="Consolas" panose="020B0609020204030204" pitchFamily="49" charset="0"/>
-              </a:rPr>
-              <a:t>def </a:t>
-            </a:r>
-            <a:r>
-              <a:rPr lang="en-US" dirty="0" err="1">
-                <a:solidFill>
-                  <a:srgbClr val="FFC66D"/>
-                </a:solidFill>
-                <a:latin typeface="Consolas" panose="020B0609020204030204" pitchFamily="49" charset="0"/>
-                <a:cs typeface="Consolas" panose="020B0609020204030204" pitchFamily="49" charset="0"/>
-              </a:rPr>
-              <a:t>readpoem</a:t>
-            </a:r>
-            <a:r>
-              <a:rPr lang="en-US" dirty="0">
-                <a:latin typeface="Consolas" panose="020B0609020204030204" pitchFamily="49" charset="0"/>
-                <a:cs typeface="Consolas" panose="020B0609020204030204" pitchFamily="49" charset="0"/>
-              </a:rPr>
-              <a:t>(filename):</a:t>
-            </a:r>
-            <a:br>
-              <a:rPr lang="en-US" dirty="0">
-                <a:latin typeface="Consolas" panose="020B0609020204030204" pitchFamily="49" charset="0"/>
-                <a:cs typeface="Consolas" panose="020B0609020204030204" pitchFamily="49" charset="0"/>
-              </a:rPr>
-            </a:br>
-            <a:r>
-              <a:rPr lang="en-US" dirty="0">
-                <a:latin typeface="Consolas" panose="020B0609020204030204" pitchFamily="49" charset="0"/>
-                <a:cs typeface="Consolas" panose="020B0609020204030204" pitchFamily="49" charset="0"/>
-              </a:rPr>
-              <a:t>    </a:t>
-            </a:r>
-            <a:r>
-              <a:rPr lang="en-US" dirty="0">
-                <a:solidFill>
-                  <a:srgbClr val="CC7832"/>
-                </a:solidFill>
-                <a:latin typeface="Consolas" panose="020B0609020204030204" pitchFamily="49" charset="0"/>
-                <a:cs typeface="Consolas" panose="020B0609020204030204" pitchFamily="49" charset="0"/>
-              </a:rPr>
-              <a:t>with </a:t>
-            </a:r>
-            <a:r>
-              <a:rPr lang="en-US" dirty="0">
-                <a:solidFill>
-                  <a:srgbClr val="8888C6"/>
-                </a:solidFill>
-                <a:latin typeface="Consolas" panose="020B0609020204030204" pitchFamily="49" charset="0"/>
-                <a:cs typeface="Consolas" panose="020B0609020204030204" pitchFamily="49" charset="0"/>
-              </a:rPr>
-              <a:t>open</a:t>
-            </a:r>
-            <a:r>
-              <a:rPr lang="en-US" dirty="0">
-                <a:latin typeface="Consolas" panose="020B0609020204030204" pitchFamily="49" charset="0"/>
-                <a:cs typeface="Consolas" panose="020B0609020204030204" pitchFamily="49" charset="0"/>
-              </a:rPr>
-              <a:t>(filename)  </a:t>
-            </a:r>
-            <a:r>
-              <a:rPr lang="en-US" dirty="0">
-                <a:solidFill>
-                  <a:srgbClr val="CC7832"/>
-                </a:solidFill>
-                <a:latin typeface="Consolas" panose="020B0609020204030204" pitchFamily="49" charset="0"/>
-                <a:cs typeface="Consolas" panose="020B0609020204030204" pitchFamily="49" charset="0"/>
-              </a:rPr>
-              <a:t>as </a:t>
-            </a:r>
-            <a:r>
-              <a:rPr lang="en-US" dirty="0">
-                <a:latin typeface="Consolas" panose="020B0609020204030204" pitchFamily="49" charset="0"/>
-                <a:cs typeface="Consolas" panose="020B0609020204030204" pitchFamily="49" charset="0"/>
-              </a:rPr>
-              <a:t>f:</a:t>
-            </a:r>
-            <a:br>
-              <a:rPr lang="en-US" dirty="0">
-                <a:latin typeface="Consolas" panose="020B0609020204030204" pitchFamily="49" charset="0"/>
-                <a:cs typeface="Consolas" panose="020B0609020204030204" pitchFamily="49" charset="0"/>
-              </a:rPr>
-            </a:br>
-            <a:r>
-              <a:rPr lang="en-US" dirty="0">
-                <a:latin typeface="Consolas" panose="020B0609020204030204" pitchFamily="49" charset="0"/>
-                <a:cs typeface="Consolas" panose="020B0609020204030204" pitchFamily="49" charset="0"/>
-              </a:rPr>
-              <a:t>        poem = </a:t>
-            </a:r>
-            <a:r>
-              <a:rPr lang="en-US" dirty="0" err="1">
-                <a:latin typeface="Consolas" panose="020B0609020204030204" pitchFamily="49" charset="0"/>
-                <a:cs typeface="Consolas" panose="020B0609020204030204" pitchFamily="49" charset="0"/>
-              </a:rPr>
-              <a:t>f.read</a:t>
-            </a:r>
-            <a:r>
-              <a:rPr lang="en-US" dirty="0">
-                <a:latin typeface="Consolas" panose="020B0609020204030204" pitchFamily="49" charset="0"/>
-                <a:cs typeface="Consolas" panose="020B0609020204030204" pitchFamily="49" charset="0"/>
-              </a:rPr>
-              <a:t>()</a:t>
-            </a:r>
-            <a:br>
-              <a:rPr lang="en-US" dirty="0">
-                <a:latin typeface="Consolas" panose="020B0609020204030204" pitchFamily="49" charset="0"/>
-                <a:cs typeface="Consolas" panose="020B0609020204030204" pitchFamily="49" charset="0"/>
-              </a:rPr>
-            </a:br>
-            <a:r>
-              <a:rPr lang="en-US" dirty="0">
-                <a:latin typeface="Consolas" panose="020B0609020204030204" pitchFamily="49" charset="0"/>
-                <a:cs typeface="Consolas" panose="020B0609020204030204" pitchFamily="49" charset="0"/>
-              </a:rPr>
-              <a:t>        </a:t>
-            </a:r>
-            <a:r>
-              <a:rPr lang="en-US" dirty="0">
-                <a:solidFill>
-                  <a:srgbClr val="CC7832"/>
-                </a:solidFill>
-                <a:latin typeface="Consolas" panose="020B0609020204030204" pitchFamily="49" charset="0"/>
-                <a:cs typeface="Consolas" panose="020B0609020204030204" pitchFamily="49" charset="0"/>
-              </a:rPr>
-              <a:t>return </a:t>
-            </a:r>
-            <a:r>
-              <a:rPr lang="en-US" dirty="0">
-                <a:latin typeface="Consolas" panose="020B0609020204030204" pitchFamily="49" charset="0"/>
-                <a:cs typeface="Consolas" panose="020B0609020204030204" pitchFamily="49" charset="0"/>
-              </a:rPr>
-              <a:t>poem</a:t>
-            </a:r>
-          </a:p>
-        </p:txBody>
-      </p:sp>
-    </p:spTree>
-    <p:extLst>
-      <p:ext uri="{BB962C8B-B14F-4D97-AF65-F5344CB8AC3E}">
-        <p14:creationId xmlns:p14="http://schemas.microsoft.com/office/powerpoint/2010/main" val="3525479270"/>
       </p:ext>
     </p:extLst>
   </p:cSld>

</xml_diff>